<commit_message>
adjusted something on the ppt
</commit_message>
<xml_diff>
--- a/DB2project.pptx
+++ b/DB2project.pptx
@@ -3389,12 +3389,32 @@
         </p:nvSpPr>
         <p:spPr/>
         <p:txBody>
-          <a:bodyPr/>
+          <a:bodyPr>
+            <a:normAutofit lnSpcReduction="10000"/>
+          </a:bodyPr>
           <a:lstStyle/>
           <a:p>
             <a:r>
               <a:rPr lang="en-GB" dirty="0"/>
-              <a:t>JPA exercise: XYZ</a:t>
+              <a:t>Project by</a:t>
+            </a:r>
+          </a:p>
+          <a:p>
+            <a:r>
+              <a:rPr lang="en-GB" dirty="0"/>
+              <a:t> Chiara Moser</a:t>
+            </a:r>
+          </a:p>
+          <a:p>
+            <a:r>
+              <a:rPr lang="en-GB" dirty="0"/>
+              <a:t>&amp;</a:t>
+            </a:r>
+          </a:p>
+          <a:p>
+            <a:r>
+              <a:rPr lang="en-GB" dirty="0"/>
+              <a:t>Danilo Catone</a:t>
             </a:r>
           </a:p>
         </p:txBody>
@@ -3510,220 +3530,265 @@
                 <a:latin typeface="Courier New" panose="02070309020205020404" pitchFamily="49" charset="0"/>
                 <a:cs typeface="Courier New" panose="02070309020205020404" pitchFamily="49" charset="0"/>
               </a:rPr>
-              <a:t>@</a:t>
+              <a:t>@NamedQuery(name = "</a:t>
             </a:r>
             <a:r>
               <a:rPr lang="en-GB" sz="1500" dirty="0" err="1">
                 <a:latin typeface="Courier New" panose="02070309020205020404" pitchFamily="49" charset="0"/>
                 <a:cs typeface="Courier New" panose="02070309020205020404" pitchFamily="49" charset="0"/>
               </a:rPr>
-              <a:t>NamedQuery</a:t>
-            </a:r>
-            <a:r>
-              <a:rPr lang="en-GB" sz="1500" dirty="0">
-                <a:latin typeface="Courier New" panose="02070309020205020404" pitchFamily="49" charset="0"/>
-                <a:cs typeface="Courier New" panose="02070309020205020404" pitchFamily="49" charset="0"/>
-              </a:rPr>
-              <a:t>(name = "</a:t>
+              <a:t>Product.findProductOfTheDay</a:t>
+            </a:r>
+            <a:r>
+              <a:rPr lang="en-GB" sz="1500" dirty="0">
+                <a:latin typeface="Courier New" panose="02070309020205020404" pitchFamily="49" charset="0"/>
+                <a:cs typeface="Courier New" panose="02070309020205020404" pitchFamily="49" charset="0"/>
+              </a:rPr>
+              <a:t>", query = "SELECT p FROM Product p  WHERE </a:t>
             </a:r>
             <a:r>
               <a:rPr lang="en-GB" sz="1500" dirty="0" err="1">
                 <a:latin typeface="Courier New" panose="02070309020205020404" pitchFamily="49" charset="0"/>
                 <a:cs typeface="Courier New" panose="02070309020205020404" pitchFamily="49" charset="0"/>
               </a:rPr>
-              <a:t>Product.findProductOfTheDay</a:t>
-            </a:r>
-            <a:r>
-              <a:rPr lang="en-GB" sz="1500" dirty="0">
-                <a:latin typeface="Courier New" panose="02070309020205020404" pitchFamily="49" charset="0"/>
-                <a:cs typeface="Courier New" panose="02070309020205020404" pitchFamily="49" charset="0"/>
-              </a:rPr>
-              <a:t>", query = "SELECT p FROM Product p  WHERE </a:t>
+              <a:t>p.productOfTheDay</a:t>
+            </a:r>
+            <a:r>
+              <a:rPr lang="en-GB" sz="1500" dirty="0">
+                <a:latin typeface="Courier New" panose="02070309020205020404" pitchFamily="49" charset="0"/>
+                <a:cs typeface="Courier New" panose="02070309020205020404" pitchFamily="49" charset="0"/>
+              </a:rPr>
+              <a:t> = ?1 ")</a:t>
+            </a:r>
+            <a:br>
+              <a:rPr lang="en-GB" sz="1500" dirty="0">
+                <a:latin typeface="Courier New" panose="02070309020205020404" pitchFamily="49" charset="0"/>
+                <a:cs typeface="Courier New" panose="02070309020205020404" pitchFamily="49" charset="0"/>
+              </a:rPr>
+            </a:br>
+            <a:r>
+              <a:rPr lang="en-GB" sz="1500" dirty="0">
+                <a:latin typeface="Courier New" panose="02070309020205020404" pitchFamily="49" charset="0"/>
+                <a:cs typeface="Courier New" panose="02070309020205020404" pitchFamily="49" charset="0"/>
+              </a:rPr>
+              <a:t>public class Product implements Serializable {</a:t>
+            </a:r>
+            <a:br>
+              <a:rPr lang="en-GB" sz="1500" dirty="0">
+                <a:latin typeface="Courier New" panose="02070309020205020404" pitchFamily="49" charset="0"/>
+                <a:cs typeface="Courier New" panose="02070309020205020404" pitchFamily="49" charset="0"/>
+              </a:rPr>
+            </a:br>
+            <a:r>
+              <a:rPr lang="en-GB" sz="1500" dirty="0">
+                <a:latin typeface="Courier New" panose="02070309020205020404" pitchFamily="49" charset="0"/>
+                <a:cs typeface="Courier New" panose="02070309020205020404" pitchFamily="49" charset="0"/>
+              </a:rPr>
+              <a:t>    private static final long </a:t>
             </a:r>
             <a:r>
               <a:rPr lang="en-GB" sz="1500" dirty="0" err="1">
                 <a:latin typeface="Courier New" panose="02070309020205020404" pitchFamily="49" charset="0"/>
                 <a:cs typeface="Courier New" panose="02070309020205020404" pitchFamily="49" charset="0"/>
               </a:rPr>
-              <a:t>p.productOfTheDay</a:t>
-            </a:r>
-            <a:r>
-              <a:rPr lang="en-GB" sz="1500" dirty="0">
-                <a:latin typeface="Courier New" panose="02070309020205020404" pitchFamily="49" charset="0"/>
-                <a:cs typeface="Courier New" panose="02070309020205020404" pitchFamily="49" charset="0"/>
-              </a:rPr>
-              <a:t> = ?1 ")</a:t>
-            </a:r>
-            <a:br>
-              <a:rPr lang="en-GB" sz="1500" dirty="0">
-                <a:latin typeface="Courier New" panose="02070309020205020404" pitchFamily="49" charset="0"/>
-                <a:cs typeface="Courier New" panose="02070309020205020404" pitchFamily="49" charset="0"/>
-              </a:rPr>
-            </a:br>
-            <a:r>
-              <a:rPr lang="en-GB" sz="1500" dirty="0">
-                <a:latin typeface="Courier New" panose="02070309020205020404" pitchFamily="49" charset="0"/>
-                <a:cs typeface="Courier New" panose="02070309020205020404" pitchFamily="49" charset="0"/>
-              </a:rPr>
-              <a:t>public class Product implements Serializable {</a:t>
-            </a:r>
-            <a:br>
-              <a:rPr lang="en-GB" sz="1500" dirty="0">
-                <a:latin typeface="Courier New" panose="02070309020205020404" pitchFamily="49" charset="0"/>
-                <a:cs typeface="Courier New" panose="02070309020205020404" pitchFamily="49" charset="0"/>
-              </a:rPr>
-            </a:br>
-            <a:r>
-              <a:rPr lang="en-GB" sz="1500" dirty="0">
-                <a:latin typeface="Courier New" panose="02070309020205020404" pitchFamily="49" charset="0"/>
-                <a:cs typeface="Courier New" panose="02070309020205020404" pitchFamily="49" charset="0"/>
-              </a:rPr>
-              <a:t>    private static final long </a:t>
+              <a:t>serialVersionUID</a:t>
+            </a:r>
+            <a:r>
+              <a:rPr lang="en-GB" sz="1500" dirty="0">
+                <a:latin typeface="Courier New" panose="02070309020205020404" pitchFamily="49" charset="0"/>
+                <a:cs typeface="Courier New" panose="02070309020205020404" pitchFamily="49" charset="0"/>
+              </a:rPr>
+              <a:t> = 1L;</a:t>
+            </a:r>
+            <a:br>
+              <a:rPr lang="en-GB" sz="1500" dirty="0">
+                <a:latin typeface="Courier New" panose="02070309020205020404" pitchFamily="49" charset="0"/>
+                <a:cs typeface="Courier New" panose="02070309020205020404" pitchFamily="49" charset="0"/>
+              </a:rPr>
+            </a:br>
+            <a:br>
+              <a:rPr lang="en-GB" sz="1500" dirty="0">
+                <a:latin typeface="Courier New" panose="02070309020205020404" pitchFamily="49" charset="0"/>
+                <a:cs typeface="Courier New" panose="02070309020205020404" pitchFamily="49" charset="0"/>
+              </a:rPr>
+            </a:br>
+            <a:r>
+              <a:rPr lang="en-GB" sz="1500" dirty="0">
+                <a:latin typeface="Courier New" panose="02070309020205020404" pitchFamily="49" charset="0"/>
+                <a:cs typeface="Courier New" panose="02070309020205020404" pitchFamily="49" charset="0"/>
+              </a:rPr>
+              <a:t>    @Id</a:t>
+            </a:r>
+            <a:br>
+              <a:rPr lang="en-GB" sz="1500" dirty="0">
+                <a:latin typeface="Courier New" panose="02070309020205020404" pitchFamily="49" charset="0"/>
+                <a:cs typeface="Courier New" panose="02070309020205020404" pitchFamily="49" charset="0"/>
+              </a:rPr>
+            </a:br>
+            <a:r>
+              <a:rPr lang="en-GB" sz="1500" dirty="0">
+                <a:latin typeface="Courier New" panose="02070309020205020404" pitchFamily="49" charset="0"/>
+                <a:cs typeface="Courier New" panose="02070309020205020404" pitchFamily="49" charset="0"/>
+              </a:rPr>
+              <a:t>    @GeneratedValue(strategy = </a:t>
             </a:r>
             <a:r>
               <a:rPr lang="en-GB" sz="1500" dirty="0" err="1">
                 <a:latin typeface="Courier New" panose="02070309020205020404" pitchFamily="49" charset="0"/>
                 <a:cs typeface="Courier New" panose="02070309020205020404" pitchFamily="49" charset="0"/>
               </a:rPr>
-              <a:t>serialVersionUID</a:t>
-            </a:r>
-            <a:r>
-              <a:rPr lang="en-GB" sz="1500" dirty="0">
-                <a:latin typeface="Courier New" panose="02070309020205020404" pitchFamily="49" charset="0"/>
-                <a:cs typeface="Courier New" panose="02070309020205020404" pitchFamily="49" charset="0"/>
-              </a:rPr>
-              <a:t> = 1L;</a:t>
-            </a:r>
-            <a:br>
-              <a:rPr lang="en-GB" sz="1500" dirty="0">
-                <a:latin typeface="Courier New" panose="02070309020205020404" pitchFamily="49" charset="0"/>
-                <a:cs typeface="Courier New" panose="02070309020205020404" pitchFamily="49" charset="0"/>
-              </a:rPr>
-            </a:br>
-            <a:br>
-              <a:rPr lang="en-GB" sz="1500" dirty="0">
-                <a:latin typeface="Courier New" panose="02070309020205020404" pitchFamily="49" charset="0"/>
-                <a:cs typeface="Courier New" panose="02070309020205020404" pitchFamily="49" charset="0"/>
-              </a:rPr>
-            </a:br>
-            <a:r>
-              <a:rPr lang="en-GB" sz="1500" dirty="0">
-                <a:latin typeface="Courier New" panose="02070309020205020404" pitchFamily="49" charset="0"/>
-                <a:cs typeface="Courier New" panose="02070309020205020404" pitchFamily="49" charset="0"/>
-              </a:rPr>
-              <a:t>    @Id</a:t>
-            </a:r>
-            <a:br>
-              <a:rPr lang="en-GB" sz="1500" dirty="0">
-                <a:latin typeface="Courier New" panose="02070309020205020404" pitchFamily="49" charset="0"/>
-                <a:cs typeface="Courier New" panose="02070309020205020404" pitchFamily="49" charset="0"/>
-              </a:rPr>
-            </a:br>
-            <a:r>
-              <a:rPr lang="en-GB" sz="1500" dirty="0">
-                <a:latin typeface="Courier New" panose="02070309020205020404" pitchFamily="49" charset="0"/>
-                <a:cs typeface="Courier New" panose="02070309020205020404" pitchFamily="49" charset="0"/>
-              </a:rPr>
-              <a:t>    @</a:t>
+              <a:t>GenerationType.IDENTITY</a:t>
+            </a:r>
+            <a:r>
+              <a:rPr lang="en-GB" sz="1500" dirty="0">
+                <a:latin typeface="Courier New" panose="02070309020205020404" pitchFamily="49" charset="0"/>
+                <a:cs typeface="Courier New" panose="02070309020205020404" pitchFamily="49" charset="0"/>
+              </a:rPr>
+              <a:t>)</a:t>
+            </a:r>
+            <a:br>
+              <a:rPr lang="en-GB" sz="1500" dirty="0">
+                <a:latin typeface="Courier New" panose="02070309020205020404" pitchFamily="49" charset="0"/>
+                <a:cs typeface="Courier New" panose="02070309020205020404" pitchFamily="49" charset="0"/>
+              </a:rPr>
+            </a:br>
+            <a:r>
+              <a:rPr lang="en-GB" sz="1500" dirty="0">
+                <a:latin typeface="Courier New" panose="02070309020205020404" pitchFamily="49" charset="0"/>
+                <a:cs typeface="Courier New" panose="02070309020205020404" pitchFamily="49" charset="0"/>
+              </a:rPr>
+              <a:t>    private int id;</a:t>
+            </a:r>
+            <a:br>
+              <a:rPr lang="en-GB" sz="1500" dirty="0">
+                <a:latin typeface="Courier New" panose="02070309020205020404" pitchFamily="49" charset="0"/>
+                <a:cs typeface="Courier New" panose="02070309020205020404" pitchFamily="49" charset="0"/>
+              </a:rPr>
+            </a:br>
+            <a:br>
+              <a:rPr lang="en-GB" sz="1500" dirty="0">
+                <a:latin typeface="Courier New" panose="02070309020205020404" pitchFamily="49" charset="0"/>
+                <a:cs typeface="Courier New" panose="02070309020205020404" pitchFamily="49" charset="0"/>
+              </a:rPr>
+            </a:br>
+            <a:r>
+              <a:rPr lang="en-GB" sz="1500" dirty="0">
+                <a:latin typeface="Courier New" panose="02070309020205020404" pitchFamily="49" charset="0"/>
+                <a:cs typeface="Courier New" panose="02070309020205020404" pitchFamily="49" charset="0"/>
+              </a:rPr>
+              <a:t>    private String name;</a:t>
+            </a:r>
+            <a:br>
+              <a:rPr lang="en-GB" sz="1500" dirty="0">
+                <a:latin typeface="Courier New" panose="02070309020205020404" pitchFamily="49" charset="0"/>
+                <a:cs typeface="Courier New" panose="02070309020205020404" pitchFamily="49" charset="0"/>
+              </a:rPr>
+            </a:br>
+            <a:br>
+              <a:rPr lang="en-GB" sz="1500" dirty="0">
+                <a:latin typeface="Courier New" panose="02070309020205020404" pitchFamily="49" charset="0"/>
+                <a:cs typeface="Courier New" panose="02070309020205020404" pitchFamily="49" charset="0"/>
+              </a:rPr>
+            </a:br>
+            <a:r>
+              <a:rPr lang="en-GB" sz="1500" dirty="0">
+                <a:latin typeface="Courier New" panose="02070309020205020404" pitchFamily="49" charset="0"/>
+                <a:cs typeface="Courier New" panose="02070309020205020404" pitchFamily="49" charset="0"/>
+              </a:rPr>
+              <a:t>    @Lob</a:t>
+            </a:r>
+            <a:br>
+              <a:rPr lang="en-GB" sz="1500" dirty="0">
+                <a:latin typeface="Courier New" panose="02070309020205020404" pitchFamily="49" charset="0"/>
+                <a:cs typeface="Courier New" panose="02070309020205020404" pitchFamily="49" charset="0"/>
+              </a:rPr>
+            </a:br>
+            <a:r>
+              <a:rPr lang="en-GB" sz="1500" dirty="0">
+                <a:latin typeface="Courier New" panose="02070309020205020404" pitchFamily="49" charset="0"/>
+                <a:cs typeface="Courier New" panose="02070309020205020404" pitchFamily="49" charset="0"/>
+              </a:rPr>
+              <a:t>    private byte[] </a:t>
             </a:r>
             <a:r>
               <a:rPr lang="en-GB" sz="1500" dirty="0" err="1">
                 <a:latin typeface="Courier New" panose="02070309020205020404" pitchFamily="49" charset="0"/>
                 <a:cs typeface="Courier New" panose="02070309020205020404" pitchFamily="49" charset="0"/>
               </a:rPr>
-              <a:t>GeneratedValue</a:t>
-            </a:r>
-            <a:r>
-              <a:rPr lang="en-GB" sz="1500" dirty="0">
-                <a:latin typeface="Courier New" panose="02070309020205020404" pitchFamily="49" charset="0"/>
-                <a:cs typeface="Courier New" panose="02070309020205020404" pitchFamily="49" charset="0"/>
-              </a:rPr>
-              <a:t>(strategy = </a:t>
+              <a:t>photoimage</a:t>
+            </a:r>
+            <a:r>
+              <a:rPr lang="en-GB" sz="1500" dirty="0">
+                <a:latin typeface="Courier New" panose="02070309020205020404" pitchFamily="49" charset="0"/>
+                <a:cs typeface="Courier New" panose="02070309020205020404" pitchFamily="49" charset="0"/>
+              </a:rPr>
+              <a:t>;</a:t>
+            </a:r>
+            <a:br>
+              <a:rPr lang="en-GB" sz="1500" dirty="0">
+                <a:latin typeface="Courier New" panose="02070309020205020404" pitchFamily="49" charset="0"/>
+                <a:cs typeface="Courier New" panose="02070309020205020404" pitchFamily="49" charset="0"/>
+              </a:rPr>
+            </a:br>
+            <a:br>
+              <a:rPr lang="en-GB" sz="1500" dirty="0">
+                <a:latin typeface="Courier New" panose="02070309020205020404" pitchFamily="49" charset="0"/>
+                <a:cs typeface="Courier New" panose="02070309020205020404" pitchFamily="49" charset="0"/>
+              </a:rPr>
+            </a:br>
+            <a:r>
+              <a:rPr lang="en-GB" sz="1500" dirty="0">
+                <a:latin typeface="Courier New" panose="02070309020205020404" pitchFamily="49" charset="0"/>
+                <a:cs typeface="Courier New" panose="02070309020205020404" pitchFamily="49" charset="0"/>
+              </a:rPr>
+              <a:t>    //@Temporal(TemporalType.DATE)</a:t>
+            </a:r>
+            <a:br>
+              <a:rPr lang="en-GB" sz="1500" dirty="0">
+                <a:latin typeface="Courier New" panose="02070309020205020404" pitchFamily="49" charset="0"/>
+                <a:cs typeface="Courier New" panose="02070309020205020404" pitchFamily="49" charset="0"/>
+              </a:rPr>
+            </a:br>
+            <a:r>
+              <a:rPr lang="en-GB" sz="1500" dirty="0">
+                <a:latin typeface="Courier New" panose="02070309020205020404" pitchFamily="49" charset="0"/>
+                <a:cs typeface="Courier New" panose="02070309020205020404" pitchFamily="49" charset="0"/>
+              </a:rPr>
+              <a:t>    @Column(unique = true)</a:t>
+            </a:r>
+            <a:br>
+              <a:rPr lang="en-GB" sz="1500" dirty="0">
+                <a:latin typeface="Courier New" panose="02070309020205020404" pitchFamily="49" charset="0"/>
+                <a:cs typeface="Courier New" panose="02070309020205020404" pitchFamily="49" charset="0"/>
+              </a:rPr>
+            </a:br>
+            <a:r>
+              <a:rPr lang="en-GB" sz="1500" dirty="0">
+                <a:latin typeface="Courier New" panose="02070309020205020404" pitchFamily="49" charset="0"/>
+                <a:cs typeface="Courier New" panose="02070309020205020404" pitchFamily="49" charset="0"/>
+              </a:rPr>
+              <a:t>    private </a:t>
             </a:r>
             <a:r>
               <a:rPr lang="en-GB" sz="1500" dirty="0" err="1">
                 <a:latin typeface="Courier New" panose="02070309020205020404" pitchFamily="49" charset="0"/>
                 <a:cs typeface="Courier New" panose="02070309020205020404" pitchFamily="49" charset="0"/>
               </a:rPr>
-              <a:t>GenerationType.IDENTITY</a:t>
-            </a:r>
-            <a:r>
-              <a:rPr lang="en-GB" sz="1500" dirty="0">
-                <a:latin typeface="Courier New" panose="02070309020205020404" pitchFamily="49" charset="0"/>
-                <a:cs typeface="Courier New" panose="02070309020205020404" pitchFamily="49" charset="0"/>
-              </a:rPr>
-              <a:t>)</a:t>
-            </a:r>
-            <a:br>
-              <a:rPr lang="en-GB" sz="1500" dirty="0">
-                <a:latin typeface="Courier New" panose="02070309020205020404" pitchFamily="49" charset="0"/>
-                <a:cs typeface="Courier New" panose="02070309020205020404" pitchFamily="49" charset="0"/>
-              </a:rPr>
-            </a:br>
-            <a:r>
-              <a:rPr lang="en-GB" sz="1500" dirty="0">
-                <a:latin typeface="Courier New" panose="02070309020205020404" pitchFamily="49" charset="0"/>
-                <a:cs typeface="Courier New" panose="02070309020205020404" pitchFamily="49" charset="0"/>
-              </a:rPr>
-              <a:t>    private int id;</a:t>
-            </a:r>
-            <a:br>
-              <a:rPr lang="en-GB" sz="1500" dirty="0">
-                <a:latin typeface="Courier New" panose="02070309020205020404" pitchFamily="49" charset="0"/>
-                <a:cs typeface="Courier New" panose="02070309020205020404" pitchFamily="49" charset="0"/>
-              </a:rPr>
-            </a:br>
-            <a:br>
-              <a:rPr lang="en-GB" sz="1500" dirty="0">
-                <a:latin typeface="Courier New" panose="02070309020205020404" pitchFamily="49" charset="0"/>
-                <a:cs typeface="Courier New" panose="02070309020205020404" pitchFamily="49" charset="0"/>
-              </a:rPr>
-            </a:br>
-            <a:r>
-              <a:rPr lang="en-GB" sz="1500" dirty="0">
-                <a:latin typeface="Courier New" panose="02070309020205020404" pitchFamily="49" charset="0"/>
-                <a:cs typeface="Courier New" panose="02070309020205020404" pitchFamily="49" charset="0"/>
-              </a:rPr>
-              <a:t>    private String name;</a:t>
-            </a:r>
-            <a:br>
-              <a:rPr lang="en-GB" sz="1500" dirty="0">
-                <a:latin typeface="Courier New" panose="02070309020205020404" pitchFamily="49" charset="0"/>
-                <a:cs typeface="Courier New" panose="02070309020205020404" pitchFamily="49" charset="0"/>
-              </a:rPr>
-            </a:br>
-            <a:br>
-              <a:rPr lang="en-GB" sz="1500" dirty="0">
-                <a:latin typeface="Courier New" panose="02070309020205020404" pitchFamily="49" charset="0"/>
-                <a:cs typeface="Courier New" panose="02070309020205020404" pitchFamily="49" charset="0"/>
-              </a:rPr>
-            </a:br>
-            <a:r>
-              <a:rPr lang="en-GB" sz="1500" dirty="0">
-                <a:latin typeface="Courier New" panose="02070309020205020404" pitchFamily="49" charset="0"/>
-                <a:cs typeface="Courier New" panose="02070309020205020404" pitchFamily="49" charset="0"/>
-              </a:rPr>
-              <a:t>    @Lob</a:t>
-            </a:r>
-            <a:br>
-              <a:rPr lang="en-GB" sz="1500" dirty="0">
-                <a:latin typeface="Courier New" panose="02070309020205020404" pitchFamily="49" charset="0"/>
-                <a:cs typeface="Courier New" panose="02070309020205020404" pitchFamily="49" charset="0"/>
-              </a:rPr>
-            </a:br>
-            <a:r>
-              <a:rPr lang="en-GB" sz="1500" dirty="0">
-                <a:latin typeface="Courier New" panose="02070309020205020404" pitchFamily="49" charset="0"/>
-                <a:cs typeface="Courier New" panose="02070309020205020404" pitchFamily="49" charset="0"/>
-              </a:rPr>
-              <a:t>    private byte[] </a:t>
+              <a:t>LocalDate</a:t>
+            </a:r>
+            <a:r>
+              <a:rPr lang="en-GB" sz="1500" dirty="0">
+                <a:latin typeface="Courier New" panose="02070309020205020404" pitchFamily="49" charset="0"/>
+                <a:cs typeface="Courier New" panose="02070309020205020404" pitchFamily="49" charset="0"/>
+              </a:rPr>
+              <a:t> </a:t>
             </a:r>
             <a:r>
               <a:rPr lang="en-GB" sz="1500" dirty="0" err="1">
                 <a:latin typeface="Courier New" panose="02070309020205020404" pitchFamily="49" charset="0"/>
                 <a:cs typeface="Courier New" panose="02070309020205020404" pitchFamily="49" charset="0"/>
               </a:rPr>
-              <a:t>photoimage</a:t>
+              <a:t>productOfTheDay</a:t>
             </a:r>
             <a:r>
               <a:rPr lang="en-GB" sz="1500" dirty="0">
@@ -3749,314 +3814,157 @@
                 <a:latin typeface="Courier New" panose="02070309020205020404" pitchFamily="49" charset="0"/>
                 <a:cs typeface="Courier New" panose="02070309020205020404" pitchFamily="49" charset="0"/>
               </a:rPr>
-              <a:t>    //@Temporal(</a:t>
+              <a:t>    @OneToOne(mappedBy = "</a:t>
             </a:r>
             <a:r>
               <a:rPr lang="en-GB" sz="1500" dirty="0" err="1">
                 <a:latin typeface="Courier New" panose="02070309020205020404" pitchFamily="49" charset="0"/>
                 <a:cs typeface="Courier New" panose="02070309020205020404" pitchFamily="49" charset="0"/>
               </a:rPr>
-              <a:t>TemporalType.DATE</a:t>
-            </a:r>
-            <a:r>
-              <a:rPr lang="en-GB" sz="1500" dirty="0">
-                <a:latin typeface="Courier New" panose="02070309020205020404" pitchFamily="49" charset="0"/>
-                <a:cs typeface="Courier New" panose="02070309020205020404" pitchFamily="49" charset="0"/>
-              </a:rPr>
-              <a:t>)</a:t>
-            </a:r>
-            <a:br>
-              <a:rPr lang="en-GB" sz="1500" dirty="0">
-                <a:latin typeface="Courier New" panose="02070309020205020404" pitchFamily="49" charset="0"/>
-                <a:cs typeface="Courier New" panose="02070309020205020404" pitchFamily="49" charset="0"/>
-              </a:rPr>
-            </a:br>
-            <a:r>
-              <a:rPr lang="en-GB" sz="1500" dirty="0">
-                <a:latin typeface="Courier New" panose="02070309020205020404" pitchFamily="49" charset="0"/>
-                <a:cs typeface="Courier New" panose="02070309020205020404" pitchFamily="49" charset="0"/>
-              </a:rPr>
-              <a:t>    @Column(unique = true)</a:t>
-            </a:r>
-            <a:br>
-              <a:rPr lang="en-GB" sz="1500" dirty="0">
-                <a:latin typeface="Courier New" panose="02070309020205020404" pitchFamily="49" charset="0"/>
-                <a:cs typeface="Courier New" panose="02070309020205020404" pitchFamily="49" charset="0"/>
-              </a:rPr>
-            </a:br>
-            <a:r>
-              <a:rPr lang="en-GB" sz="1500" dirty="0">
-                <a:latin typeface="Courier New" panose="02070309020205020404" pitchFamily="49" charset="0"/>
-                <a:cs typeface="Courier New" panose="02070309020205020404" pitchFamily="49" charset="0"/>
-              </a:rPr>
-              <a:t>    private </a:t>
+              <a:t>relatedProduct</a:t>
+            </a:r>
+            <a:r>
+              <a:rPr lang="en-GB" sz="1500" dirty="0">
+                <a:latin typeface="Courier New" panose="02070309020205020404" pitchFamily="49" charset="0"/>
+                <a:cs typeface="Courier New" panose="02070309020205020404" pitchFamily="49" charset="0"/>
+              </a:rPr>
+              <a:t>",fetch = </a:t>
             </a:r>
             <a:r>
               <a:rPr lang="en-GB" sz="1500" dirty="0" err="1">
                 <a:latin typeface="Courier New" panose="02070309020205020404" pitchFamily="49" charset="0"/>
                 <a:cs typeface="Courier New" panose="02070309020205020404" pitchFamily="49" charset="0"/>
               </a:rPr>
-              <a:t>LocalDate</a:t>
-            </a:r>
-            <a:r>
-              <a:rPr lang="en-GB" sz="1500" dirty="0">
-                <a:latin typeface="Courier New" panose="02070309020205020404" pitchFamily="49" charset="0"/>
-                <a:cs typeface="Courier New" panose="02070309020205020404" pitchFamily="49" charset="0"/>
-              </a:rPr>
-              <a:t> </a:t>
+              <a:t>FetchType.EAGER</a:t>
+            </a:r>
+            <a:r>
+              <a:rPr lang="en-GB" sz="1500" dirty="0">
+                <a:latin typeface="Courier New" panose="02070309020205020404" pitchFamily="49" charset="0"/>
+                <a:cs typeface="Courier New" panose="02070309020205020404" pitchFamily="49" charset="0"/>
+              </a:rPr>
+              <a:t>, cascade = { </a:t>
             </a:r>
             <a:r>
               <a:rPr lang="en-GB" sz="1500" dirty="0" err="1">
                 <a:latin typeface="Courier New" panose="02070309020205020404" pitchFamily="49" charset="0"/>
                 <a:cs typeface="Courier New" panose="02070309020205020404" pitchFamily="49" charset="0"/>
               </a:rPr>
-              <a:t>productOfTheDay</a:t>
-            </a:r>
-            <a:r>
-              <a:rPr lang="en-GB" sz="1500" dirty="0">
-                <a:latin typeface="Courier New" panose="02070309020205020404" pitchFamily="49" charset="0"/>
-                <a:cs typeface="Courier New" panose="02070309020205020404" pitchFamily="49" charset="0"/>
-              </a:rPr>
-              <a:t>;</a:t>
-            </a:r>
-            <a:br>
-              <a:rPr lang="en-GB" sz="1500" dirty="0">
-                <a:latin typeface="Courier New" panose="02070309020205020404" pitchFamily="49" charset="0"/>
-                <a:cs typeface="Courier New" panose="02070309020205020404" pitchFamily="49" charset="0"/>
-              </a:rPr>
-            </a:br>
-            <a:br>
-              <a:rPr lang="en-GB" sz="1500" dirty="0">
-                <a:latin typeface="Courier New" panose="02070309020205020404" pitchFamily="49" charset="0"/>
-                <a:cs typeface="Courier New" panose="02070309020205020404" pitchFamily="49" charset="0"/>
-              </a:rPr>
-            </a:br>
-            <a:r>
-              <a:rPr lang="en-GB" sz="1500" dirty="0">
-                <a:latin typeface="Courier New" panose="02070309020205020404" pitchFamily="49" charset="0"/>
-                <a:cs typeface="Courier New" panose="02070309020205020404" pitchFamily="49" charset="0"/>
-              </a:rPr>
-              <a:t>    @</a:t>
+              <a:t>CascadeType.PERSIST</a:t>
+            </a:r>
+            <a:r>
+              <a:rPr lang="en-GB" sz="1500" dirty="0">
+                <a:latin typeface="Courier New" panose="02070309020205020404" pitchFamily="49" charset="0"/>
+                <a:cs typeface="Courier New" panose="02070309020205020404" pitchFamily="49" charset="0"/>
+              </a:rPr>
+              <a:t>, </a:t>
             </a:r>
             <a:r>
               <a:rPr lang="en-GB" sz="1500" dirty="0" err="1">
                 <a:latin typeface="Courier New" panose="02070309020205020404" pitchFamily="49" charset="0"/>
                 <a:cs typeface="Courier New" panose="02070309020205020404" pitchFamily="49" charset="0"/>
               </a:rPr>
-              <a:t>OneToOne</a:t>
-            </a:r>
-            <a:r>
-              <a:rPr lang="en-GB" sz="1500" dirty="0">
-                <a:latin typeface="Courier New" panose="02070309020205020404" pitchFamily="49" charset="0"/>
-                <a:cs typeface="Courier New" panose="02070309020205020404" pitchFamily="49" charset="0"/>
-              </a:rPr>
-              <a:t>(</a:t>
+              <a:t>CascadeType.REMOVE</a:t>
+            </a:r>
+            <a:r>
+              <a:rPr lang="en-GB" sz="1500" dirty="0">
+                <a:latin typeface="Courier New" panose="02070309020205020404" pitchFamily="49" charset="0"/>
+                <a:cs typeface="Courier New" panose="02070309020205020404" pitchFamily="49" charset="0"/>
+              </a:rPr>
+              <a:t> }, </a:t>
             </a:r>
             <a:r>
               <a:rPr lang="en-GB" sz="1500" dirty="0" err="1">
                 <a:latin typeface="Courier New" panose="02070309020205020404" pitchFamily="49" charset="0"/>
                 <a:cs typeface="Courier New" panose="02070309020205020404" pitchFamily="49" charset="0"/>
               </a:rPr>
-              <a:t>mappedBy</a:t>
-            </a:r>
-            <a:r>
-              <a:rPr lang="en-GB" sz="1500" dirty="0">
-                <a:latin typeface="Courier New" panose="02070309020205020404" pitchFamily="49" charset="0"/>
-                <a:cs typeface="Courier New" panose="02070309020205020404" pitchFamily="49" charset="0"/>
-              </a:rPr>
-              <a:t> = "</a:t>
+              <a:t>orphanRemoval</a:t>
+            </a:r>
+            <a:r>
+              <a:rPr lang="en-GB" sz="1500" dirty="0">
+                <a:latin typeface="Courier New" panose="02070309020205020404" pitchFamily="49" charset="0"/>
+                <a:cs typeface="Courier New" panose="02070309020205020404" pitchFamily="49" charset="0"/>
+              </a:rPr>
+              <a:t> = true)</a:t>
+            </a:r>
+            <a:br>
+              <a:rPr lang="en-GB" sz="1500" dirty="0">
+                <a:latin typeface="Courier New" panose="02070309020205020404" pitchFamily="49" charset="0"/>
+                <a:cs typeface="Courier New" panose="02070309020205020404" pitchFamily="49" charset="0"/>
+              </a:rPr>
+            </a:br>
+            <a:r>
+              <a:rPr lang="en-GB" sz="1500" dirty="0">
+                <a:latin typeface="Courier New" panose="02070309020205020404" pitchFamily="49" charset="0"/>
+                <a:cs typeface="Courier New" panose="02070309020205020404" pitchFamily="49" charset="0"/>
+              </a:rPr>
+              <a:t>    private Questionnaire questionnaire;</a:t>
+            </a:r>
+            <a:br>
+              <a:rPr lang="en-GB" sz="1500" dirty="0">
+                <a:latin typeface="Courier New" panose="02070309020205020404" pitchFamily="49" charset="0"/>
+                <a:cs typeface="Courier New" panose="02070309020205020404" pitchFamily="49" charset="0"/>
+              </a:rPr>
+            </a:br>
+            <a:br>
+              <a:rPr lang="en-GB" sz="1500" dirty="0">
+                <a:latin typeface="Courier New" panose="02070309020205020404" pitchFamily="49" charset="0"/>
+                <a:cs typeface="Courier New" panose="02070309020205020404" pitchFamily="49" charset="0"/>
+              </a:rPr>
+            </a:br>
+            <a:r>
+              <a:rPr lang="en-GB" sz="1500" dirty="0">
+                <a:latin typeface="Courier New" panose="02070309020205020404" pitchFamily="49" charset="0"/>
+                <a:cs typeface="Courier New" panose="02070309020205020404" pitchFamily="49" charset="0"/>
+              </a:rPr>
+              <a:t>    @OneToMany(mappedBy = "product", cascade = {</a:t>
             </a:r>
             <a:r>
               <a:rPr lang="en-GB" sz="1500" dirty="0" err="1">
                 <a:latin typeface="Courier New" panose="02070309020205020404" pitchFamily="49" charset="0"/>
                 <a:cs typeface="Courier New" panose="02070309020205020404" pitchFamily="49" charset="0"/>
               </a:rPr>
-              <a:t>relatedProduct</a:t>
-            </a:r>
-            <a:r>
-              <a:rPr lang="en-GB" sz="1500" dirty="0">
-                <a:latin typeface="Courier New" panose="02070309020205020404" pitchFamily="49" charset="0"/>
-                <a:cs typeface="Courier New" panose="02070309020205020404" pitchFamily="49" charset="0"/>
-              </a:rPr>
-              <a:t>",fetch = </a:t>
+              <a:t>CascadeType.REMOVE</a:t>
+            </a:r>
+            <a:r>
+              <a:rPr lang="en-GB" sz="1500" dirty="0">
+                <a:latin typeface="Courier New" panose="02070309020205020404" pitchFamily="49" charset="0"/>
+                <a:cs typeface="Courier New" panose="02070309020205020404" pitchFamily="49" charset="0"/>
+              </a:rPr>
+              <a:t>,</a:t>
+            </a:r>
+            <a:br>
+              <a:rPr lang="en-GB" sz="1500" dirty="0">
+                <a:latin typeface="Courier New" panose="02070309020205020404" pitchFamily="49" charset="0"/>
+                <a:cs typeface="Courier New" panose="02070309020205020404" pitchFamily="49" charset="0"/>
+              </a:rPr>
+            </a:br>
+            <a:r>
+              <a:rPr lang="en-GB" sz="1500" dirty="0">
+                <a:latin typeface="Courier New" panose="02070309020205020404" pitchFamily="49" charset="0"/>
+                <a:cs typeface="Courier New" panose="02070309020205020404" pitchFamily="49" charset="0"/>
+              </a:rPr>
+              <a:t>            </a:t>
             </a:r>
             <a:r>
               <a:rPr lang="en-GB" sz="1500" dirty="0" err="1">
                 <a:latin typeface="Courier New" panose="02070309020205020404" pitchFamily="49" charset="0"/>
                 <a:cs typeface="Courier New" panose="02070309020205020404" pitchFamily="49" charset="0"/>
               </a:rPr>
-              <a:t>FetchType.EAGER</a:t>
-            </a:r>
-            <a:r>
-              <a:rPr lang="en-GB" sz="1500" dirty="0">
-                <a:latin typeface="Courier New" panose="02070309020205020404" pitchFamily="49" charset="0"/>
-                <a:cs typeface="Courier New" panose="02070309020205020404" pitchFamily="49" charset="0"/>
-              </a:rPr>
-              <a:t>, cascade = { </a:t>
+              <a:t>CascadeType.REFRESH</a:t>
+            </a:r>
+            <a:r>
+              <a:rPr lang="en-GB" sz="1500" dirty="0">
+                <a:latin typeface="Courier New" panose="02070309020205020404" pitchFamily="49" charset="0"/>
+                <a:cs typeface="Courier New" panose="02070309020205020404" pitchFamily="49" charset="0"/>
+              </a:rPr>
+              <a:t> }, fetch = </a:t>
             </a:r>
             <a:r>
               <a:rPr lang="en-GB" sz="1500" dirty="0" err="1">
                 <a:latin typeface="Courier New" panose="02070309020205020404" pitchFamily="49" charset="0"/>
                 <a:cs typeface="Courier New" panose="02070309020205020404" pitchFamily="49" charset="0"/>
               </a:rPr>
-              <a:t>CascadeType.PERSIST</a:t>
-            </a:r>
-            <a:r>
-              <a:rPr lang="en-GB" sz="1500" dirty="0">
-                <a:latin typeface="Courier New" panose="02070309020205020404" pitchFamily="49" charset="0"/>
-                <a:cs typeface="Courier New" panose="02070309020205020404" pitchFamily="49" charset="0"/>
-              </a:rPr>
-              <a:t>, </a:t>
-            </a:r>
-            <a:r>
-              <a:rPr lang="en-GB" sz="1500" dirty="0" err="1">
-                <a:latin typeface="Courier New" panose="02070309020205020404" pitchFamily="49" charset="0"/>
-                <a:cs typeface="Courier New" panose="02070309020205020404" pitchFamily="49" charset="0"/>
-              </a:rPr>
-              <a:t>CascadeType.REMOVE</a:t>
-            </a:r>
-            <a:r>
-              <a:rPr lang="en-GB" sz="1500" dirty="0">
-                <a:latin typeface="Courier New" panose="02070309020205020404" pitchFamily="49" charset="0"/>
-                <a:cs typeface="Courier New" panose="02070309020205020404" pitchFamily="49" charset="0"/>
-              </a:rPr>
-              <a:t> }, </a:t>
-            </a:r>
-            <a:r>
-              <a:rPr lang="en-GB" sz="1500" dirty="0" err="1">
-                <a:latin typeface="Courier New" panose="02070309020205020404" pitchFamily="49" charset="0"/>
-                <a:cs typeface="Courier New" panose="02070309020205020404" pitchFamily="49" charset="0"/>
-              </a:rPr>
-              <a:t>orphanRemoval</a:t>
-            </a:r>
-            <a:r>
-              <a:rPr lang="en-GB" sz="1500" dirty="0">
-                <a:latin typeface="Courier New" panose="02070309020205020404" pitchFamily="49" charset="0"/>
-                <a:cs typeface="Courier New" panose="02070309020205020404" pitchFamily="49" charset="0"/>
-              </a:rPr>
-              <a:t> = true)</a:t>
-            </a:r>
-            <a:br>
-              <a:rPr lang="en-GB" sz="1500" dirty="0">
-                <a:latin typeface="Courier New" panose="02070309020205020404" pitchFamily="49" charset="0"/>
-                <a:cs typeface="Courier New" panose="02070309020205020404" pitchFamily="49" charset="0"/>
-              </a:rPr>
-            </a:br>
-            <a:r>
-              <a:rPr lang="en-GB" sz="1500" dirty="0">
-                <a:latin typeface="Courier New" panose="02070309020205020404" pitchFamily="49" charset="0"/>
-                <a:cs typeface="Courier New" panose="02070309020205020404" pitchFamily="49" charset="0"/>
-              </a:rPr>
-              <a:t>    private Questionnaire questionnaire;</a:t>
-            </a:r>
-            <a:br>
-              <a:rPr lang="en-GB" sz="1500" dirty="0">
-                <a:latin typeface="Courier New" panose="02070309020205020404" pitchFamily="49" charset="0"/>
-                <a:cs typeface="Courier New" panose="02070309020205020404" pitchFamily="49" charset="0"/>
-              </a:rPr>
-            </a:br>
-            <a:br>
-              <a:rPr lang="en-GB" sz="1500" dirty="0">
-                <a:latin typeface="Courier New" panose="02070309020205020404" pitchFamily="49" charset="0"/>
-                <a:cs typeface="Courier New" panose="02070309020205020404" pitchFamily="49" charset="0"/>
-              </a:rPr>
-            </a:br>
-            <a:r>
-              <a:rPr lang="en-GB" sz="1500" dirty="0">
-                <a:latin typeface="Courier New" panose="02070309020205020404" pitchFamily="49" charset="0"/>
-                <a:cs typeface="Courier New" panose="02070309020205020404" pitchFamily="49" charset="0"/>
-              </a:rPr>
-              <a:t>    @</a:t>
-            </a:r>
-            <a:r>
-              <a:rPr lang="en-GB" sz="1500" dirty="0" err="1">
-                <a:latin typeface="Courier New" panose="02070309020205020404" pitchFamily="49" charset="0"/>
-                <a:cs typeface="Courier New" panose="02070309020205020404" pitchFamily="49" charset="0"/>
-              </a:rPr>
-              <a:t>OneToMany</a:t>
-            </a:r>
-            <a:r>
-              <a:rPr lang="en-GB" sz="1500" dirty="0">
-                <a:latin typeface="Courier New" panose="02070309020205020404" pitchFamily="49" charset="0"/>
-                <a:cs typeface="Courier New" panose="02070309020205020404" pitchFamily="49" charset="0"/>
-              </a:rPr>
-              <a:t>(</a:t>
-            </a:r>
-            <a:r>
-              <a:rPr lang="en-GB" sz="1500" dirty="0" err="1">
-                <a:latin typeface="Courier New" panose="02070309020205020404" pitchFamily="49" charset="0"/>
-                <a:cs typeface="Courier New" panose="02070309020205020404" pitchFamily="49" charset="0"/>
-              </a:rPr>
-              <a:t>mappedBy</a:t>
-            </a:r>
-            <a:r>
-              <a:rPr lang="en-GB" sz="1500" dirty="0">
-                <a:latin typeface="Courier New" panose="02070309020205020404" pitchFamily="49" charset="0"/>
-                <a:cs typeface="Courier New" panose="02070309020205020404" pitchFamily="49" charset="0"/>
-              </a:rPr>
-              <a:t> = "product", cascade = { </a:t>
-            </a:r>
-            <a:r>
-              <a:rPr lang="en-GB" sz="1500" dirty="0" err="1">
-                <a:latin typeface="Courier New" panose="02070309020205020404" pitchFamily="49" charset="0"/>
-                <a:cs typeface="Courier New" panose="02070309020205020404" pitchFamily="49" charset="0"/>
-              </a:rPr>
-              <a:t>CascadeType.PERSIST</a:t>
-            </a:r>
-            <a:r>
-              <a:rPr lang="en-GB" sz="1500" dirty="0">
-                <a:latin typeface="Courier New" panose="02070309020205020404" pitchFamily="49" charset="0"/>
-                <a:cs typeface="Courier New" panose="02070309020205020404" pitchFamily="49" charset="0"/>
-              </a:rPr>
-              <a:t>, </a:t>
-            </a:r>
-            <a:r>
-              <a:rPr lang="en-GB" sz="1500" dirty="0" err="1">
-                <a:latin typeface="Courier New" panose="02070309020205020404" pitchFamily="49" charset="0"/>
-                <a:cs typeface="Courier New" panose="02070309020205020404" pitchFamily="49" charset="0"/>
-              </a:rPr>
-              <a:t>CascadeType.REMOVE</a:t>
-            </a:r>
-            <a:r>
-              <a:rPr lang="en-GB" sz="1500" dirty="0">
-                <a:latin typeface="Courier New" panose="02070309020205020404" pitchFamily="49" charset="0"/>
-                <a:cs typeface="Courier New" panose="02070309020205020404" pitchFamily="49" charset="0"/>
-              </a:rPr>
-              <a:t>,</a:t>
-            </a:r>
-            <a:br>
-              <a:rPr lang="en-GB" sz="1500" dirty="0">
-                <a:latin typeface="Courier New" panose="02070309020205020404" pitchFamily="49" charset="0"/>
-                <a:cs typeface="Courier New" panose="02070309020205020404" pitchFamily="49" charset="0"/>
-              </a:rPr>
-            </a:br>
-            <a:r>
-              <a:rPr lang="en-GB" sz="1500" dirty="0">
-                <a:latin typeface="Courier New" panose="02070309020205020404" pitchFamily="49" charset="0"/>
-                <a:cs typeface="Courier New" panose="02070309020205020404" pitchFamily="49" charset="0"/>
-              </a:rPr>
-              <a:t>            </a:t>
-            </a:r>
-            <a:r>
-              <a:rPr lang="en-GB" sz="1500" dirty="0" err="1">
-                <a:latin typeface="Courier New" panose="02070309020205020404" pitchFamily="49" charset="0"/>
-                <a:cs typeface="Courier New" panose="02070309020205020404" pitchFamily="49" charset="0"/>
-              </a:rPr>
-              <a:t>CascadeType.REFRESH</a:t>
-            </a:r>
-            <a:r>
-              <a:rPr lang="en-GB" sz="1500" dirty="0">
-                <a:latin typeface="Courier New" panose="02070309020205020404" pitchFamily="49" charset="0"/>
-                <a:cs typeface="Courier New" panose="02070309020205020404" pitchFamily="49" charset="0"/>
-              </a:rPr>
-              <a:t> }, fetch = </a:t>
-            </a:r>
-            <a:r>
-              <a:rPr lang="en-GB" sz="1500" dirty="0" err="1">
-                <a:latin typeface="Courier New" panose="02070309020205020404" pitchFamily="49" charset="0"/>
-                <a:cs typeface="Courier New" panose="02070309020205020404" pitchFamily="49" charset="0"/>
-              </a:rPr>
-              <a:t>FetchType.EAGER</a:t>
+              <a:t>FetchType.Lazy</a:t>
             </a:r>
             <a:r>
               <a:rPr lang="en-GB" sz="1500" dirty="0">
@@ -4998,49 +4906,120 @@
                 <a:latin typeface="Courier New" panose="02070309020205020404" pitchFamily="49" charset="0"/>
                 <a:cs typeface="Courier New" panose="02070309020205020404" pitchFamily="49" charset="0"/>
               </a:rPr>
-              <a:t>@</a:t>
+              <a:t>@NamedQuery(name="Questionnaire.findByProdId", query = "SELECT q FROM Questionnaire q WHERE </a:t>
             </a:r>
             <a:r>
               <a:rPr lang="en-GB" sz="1100" dirty="0" err="1">
                 <a:latin typeface="Courier New" panose="02070309020205020404" pitchFamily="49" charset="0"/>
                 <a:cs typeface="Courier New" panose="02070309020205020404" pitchFamily="49" charset="0"/>
               </a:rPr>
-              <a:t>NamedQuery</a:t>
+              <a:t>q.relatedProduct</a:t>
             </a:r>
             <a:r>
               <a:rPr lang="en-GB" sz="1100" dirty="0">
                 <a:latin typeface="Courier New" panose="02070309020205020404" pitchFamily="49" charset="0"/>
                 <a:cs typeface="Courier New" panose="02070309020205020404" pitchFamily="49" charset="0"/>
               </a:rPr>
-              <a:t>(name="</a:t>
+              <a:t> = ?1 ")</a:t>
+            </a:r>
+            <a:br>
+              <a:rPr lang="en-GB" sz="1100" dirty="0">
+                <a:latin typeface="Courier New" panose="02070309020205020404" pitchFamily="49" charset="0"/>
+                <a:cs typeface="Courier New" panose="02070309020205020404" pitchFamily="49" charset="0"/>
+              </a:rPr>
+            </a:br>
+            <a:r>
+              <a:rPr lang="en-GB" sz="1100" dirty="0">
+                <a:latin typeface="Courier New" panose="02070309020205020404" pitchFamily="49" charset="0"/>
+                <a:cs typeface="Courier New" panose="02070309020205020404" pitchFamily="49" charset="0"/>
+              </a:rPr>
+              <a:t>@NamedQuery(name="Questionnaire.findAllQuestionnaires", query = "SELECT q FROM Questionnaire q")</a:t>
+            </a:r>
+            <a:br>
+              <a:rPr lang="en-GB" sz="1100" dirty="0">
+                <a:latin typeface="Courier New" panose="02070309020205020404" pitchFamily="49" charset="0"/>
+                <a:cs typeface="Courier New" panose="02070309020205020404" pitchFamily="49" charset="0"/>
+              </a:rPr>
+            </a:br>
+            <a:r>
+              <a:rPr lang="en-GB" sz="1100" dirty="0">
+                <a:latin typeface="Courier New" panose="02070309020205020404" pitchFamily="49" charset="0"/>
+                <a:cs typeface="Courier New" panose="02070309020205020404" pitchFamily="49" charset="0"/>
+              </a:rPr>
+              <a:t>public class Questionnaire implements Serializable {</a:t>
+            </a:r>
+            <a:br>
+              <a:rPr lang="en-GB" sz="1100" dirty="0">
+                <a:latin typeface="Courier New" panose="02070309020205020404" pitchFamily="49" charset="0"/>
+                <a:cs typeface="Courier New" panose="02070309020205020404" pitchFamily="49" charset="0"/>
+              </a:rPr>
+            </a:br>
+            <a:r>
+              <a:rPr lang="en-GB" sz="1100" dirty="0">
+                <a:latin typeface="Courier New" panose="02070309020205020404" pitchFamily="49" charset="0"/>
+                <a:cs typeface="Courier New" panose="02070309020205020404" pitchFamily="49" charset="0"/>
+              </a:rPr>
+              <a:t>    private static final long </a:t>
             </a:r>
             <a:r>
               <a:rPr lang="en-GB" sz="1100" dirty="0" err="1">
                 <a:latin typeface="Courier New" panose="02070309020205020404" pitchFamily="49" charset="0"/>
                 <a:cs typeface="Courier New" panose="02070309020205020404" pitchFamily="49" charset="0"/>
               </a:rPr>
-              <a:t>Questionnaire.findByProdId</a:t>
+              <a:t>serialVersionUID</a:t>
             </a:r>
             <a:r>
               <a:rPr lang="en-GB" sz="1100" dirty="0">
                 <a:latin typeface="Courier New" panose="02070309020205020404" pitchFamily="49" charset="0"/>
                 <a:cs typeface="Courier New" panose="02070309020205020404" pitchFamily="49" charset="0"/>
               </a:rPr>
-              <a:t>", query = "SELECT q FROM Questionnaire q WHERE </a:t>
+              <a:t> = 1L;</a:t>
+            </a:r>
+            <a:br>
+              <a:rPr lang="en-GB" sz="1100" dirty="0">
+                <a:latin typeface="Courier New" panose="02070309020205020404" pitchFamily="49" charset="0"/>
+                <a:cs typeface="Courier New" panose="02070309020205020404" pitchFamily="49" charset="0"/>
+              </a:rPr>
+            </a:br>
+            <a:br>
+              <a:rPr lang="en-GB" sz="1100" dirty="0">
+                <a:latin typeface="Courier New" panose="02070309020205020404" pitchFamily="49" charset="0"/>
+                <a:cs typeface="Courier New" panose="02070309020205020404" pitchFamily="49" charset="0"/>
+              </a:rPr>
+            </a:br>
+            <a:r>
+              <a:rPr lang="en-GB" sz="1100" dirty="0">
+                <a:latin typeface="Courier New" panose="02070309020205020404" pitchFamily="49" charset="0"/>
+                <a:cs typeface="Courier New" panose="02070309020205020404" pitchFamily="49" charset="0"/>
+              </a:rPr>
+              <a:t>    @Id</a:t>
+            </a:r>
+            <a:br>
+              <a:rPr lang="en-GB" sz="1100" dirty="0">
+                <a:latin typeface="Courier New" panose="02070309020205020404" pitchFamily="49" charset="0"/>
+                <a:cs typeface="Courier New" panose="02070309020205020404" pitchFamily="49" charset="0"/>
+              </a:rPr>
+            </a:br>
+            <a:r>
+              <a:rPr lang="en-GB" sz="1100" dirty="0">
+                <a:latin typeface="Courier New" panose="02070309020205020404" pitchFamily="49" charset="0"/>
+                <a:cs typeface="Courier New" panose="02070309020205020404" pitchFamily="49" charset="0"/>
+              </a:rPr>
+              <a:t>    @GeneratedValue(strategy = </a:t>
             </a:r>
             <a:r>
               <a:rPr lang="en-GB" sz="1100" dirty="0" err="1">
                 <a:latin typeface="Courier New" panose="02070309020205020404" pitchFamily="49" charset="0"/>
                 <a:cs typeface="Courier New" panose="02070309020205020404" pitchFamily="49" charset="0"/>
               </a:rPr>
-              <a:t>q.relatedProduct</a:t>
+              <a:t>GenerationType.IDENTITY</a:t>
             </a:r>
             <a:r>
               <a:rPr lang="en-GB" sz="1100" dirty="0">
                 <a:latin typeface="Courier New" panose="02070309020205020404" pitchFamily="49" charset="0"/>
                 <a:cs typeface="Courier New" panose="02070309020205020404" pitchFamily="49" charset="0"/>
               </a:rPr>
-              <a:t> = ?1 ")</a:t>
+              <a:t>)</a:t>
             </a:r>
             <a:br>
               <a:rPr lang="en-GB" sz="1100" dirty="0">
@@ -5053,82 +5032,143 @@
                 <a:latin typeface="Courier New" panose="02070309020205020404" pitchFamily="49" charset="0"/>
                 <a:cs typeface="Courier New" panose="02070309020205020404" pitchFamily="49" charset="0"/>
               </a:rPr>
-              <a:t>@</a:t>
+              <a:t>    private int id;</a:t>
+            </a:r>
+            <a:br>
+              <a:rPr lang="en-GB" sz="1100" dirty="0">
+                <a:latin typeface="Courier New" panose="02070309020205020404" pitchFamily="49" charset="0"/>
+                <a:cs typeface="Courier New" panose="02070309020205020404" pitchFamily="49" charset="0"/>
+              </a:rPr>
+            </a:br>
+            <a:br>
+              <a:rPr lang="en-GB" sz="1100" dirty="0">
+                <a:latin typeface="Courier New" panose="02070309020205020404" pitchFamily="49" charset="0"/>
+                <a:cs typeface="Courier New" panose="02070309020205020404" pitchFamily="49" charset="0"/>
+              </a:rPr>
+            </a:br>
+            <a:r>
+              <a:rPr lang="en-GB" sz="1100" dirty="0">
+                <a:latin typeface="Courier New" panose="02070309020205020404" pitchFamily="49" charset="0"/>
+                <a:cs typeface="Courier New" panose="02070309020205020404" pitchFamily="49" charset="0"/>
+              </a:rPr>
+              <a:t>    @OneToOne(fetch = </a:t>
             </a:r>
             <a:r>
               <a:rPr lang="en-GB" sz="1100" dirty="0" err="1">
                 <a:latin typeface="Courier New" panose="02070309020205020404" pitchFamily="49" charset="0"/>
                 <a:cs typeface="Courier New" panose="02070309020205020404" pitchFamily="49" charset="0"/>
               </a:rPr>
-              <a:t>NamedQuery</a:t>
+              <a:t>FetchType.EAGER</a:t>
             </a:r>
             <a:r>
               <a:rPr lang="en-GB" sz="1100" dirty="0">
                 <a:latin typeface="Courier New" panose="02070309020205020404" pitchFamily="49" charset="0"/>
                 <a:cs typeface="Courier New" panose="02070309020205020404" pitchFamily="49" charset="0"/>
               </a:rPr>
-              <a:t>(name="</a:t>
+              <a:t>, </a:t>
             </a:r>
             <a:r>
               <a:rPr lang="en-GB" sz="1100" dirty="0" err="1">
                 <a:latin typeface="Courier New" panose="02070309020205020404" pitchFamily="49" charset="0"/>
                 <a:cs typeface="Courier New" panose="02070309020205020404" pitchFamily="49" charset="0"/>
               </a:rPr>
-              <a:t>Questionnaire.findAllQuestionnaires</a:t>
+              <a:t>orphanRemoval</a:t>
             </a:r>
             <a:r>
               <a:rPr lang="en-GB" sz="1100" dirty="0">
                 <a:latin typeface="Courier New" panose="02070309020205020404" pitchFamily="49" charset="0"/>
                 <a:cs typeface="Courier New" panose="02070309020205020404" pitchFamily="49" charset="0"/>
               </a:rPr>
-              <a:t>", query = "SELECT q FROM Questionnaire q")</a:t>
-            </a:r>
-            <a:br>
+              <a:t> = true, cascade = { </a:t>
+            </a:r>
+            <a:r>
+              <a:rPr lang="en-GB" sz="1100" dirty="0" err="1">
+                <a:latin typeface="Courier New" panose="02070309020205020404" pitchFamily="49" charset="0"/>
+                <a:cs typeface="Courier New" panose="02070309020205020404" pitchFamily="49" charset="0"/>
+              </a:rPr>
+              <a:t>CascadeType.PERSIST</a:t>
+            </a:r>
+            <a:r>
               <a:rPr lang="en-GB" sz="1100" dirty="0">
                 <a:latin typeface="Courier New" panose="02070309020205020404" pitchFamily="49" charset="0"/>
                 <a:cs typeface="Courier New" panose="02070309020205020404" pitchFamily="49" charset="0"/>
               </a:rPr>
-            </a:br>
-            <a:r>
+              <a:t>})</a:t>
+            </a:r>
+            <a:br>
               <a:rPr lang="en-GB" sz="1100" dirty="0">
                 <a:latin typeface="Courier New" panose="02070309020205020404" pitchFamily="49" charset="0"/>
                 <a:cs typeface="Courier New" panose="02070309020205020404" pitchFamily="49" charset="0"/>
               </a:rPr>
-              <a:t>public class Questionnaire implements Serializable {</a:t>
-            </a:r>
-            <a:br>
+            </a:br>
+            <a:r>
               <a:rPr lang="en-GB" sz="1100" dirty="0">
                 <a:latin typeface="Courier New" panose="02070309020205020404" pitchFamily="49" charset="0"/>
                 <a:cs typeface="Courier New" panose="02070309020205020404" pitchFamily="49" charset="0"/>
               </a:rPr>
-            </a:br>
+              <a:t>    private Product </a:t>
+            </a:r>
+            <a:r>
+              <a:rPr lang="en-GB" sz="1100" dirty="0" err="1">
+                <a:latin typeface="Courier New" panose="02070309020205020404" pitchFamily="49" charset="0"/>
+                <a:cs typeface="Courier New" panose="02070309020205020404" pitchFamily="49" charset="0"/>
+              </a:rPr>
+              <a:t>relatedProduct</a:t>
+            </a:r>
             <a:r>
               <a:rPr lang="en-GB" sz="1100" dirty="0">
                 <a:latin typeface="Courier New" panose="02070309020205020404" pitchFamily="49" charset="0"/>
                 <a:cs typeface="Courier New" panose="02070309020205020404" pitchFamily="49" charset="0"/>
               </a:rPr>
-              <a:t>    private static final long </a:t>
+              <a:t>;</a:t>
+            </a:r>
+            <a:br>
+              <a:rPr lang="en-GB" sz="1100" dirty="0">
+                <a:latin typeface="Courier New" panose="02070309020205020404" pitchFamily="49" charset="0"/>
+                <a:cs typeface="Courier New" panose="02070309020205020404" pitchFamily="49" charset="0"/>
+              </a:rPr>
+            </a:br>
+            <a:br>
+              <a:rPr lang="en-GB" sz="1100" dirty="0">
+                <a:latin typeface="Courier New" panose="02070309020205020404" pitchFamily="49" charset="0"/>
+                <a:cs typeface="Courier New" panose="02070309020205020404" pitchFamily="49" charset="0"/>
+              </a:rPr>
+            </a:br>
+            <a:r>
+              <a:rPr lang="en-GB" sz="1100" dirty="0">
+                <a:latin typeface="Courier New" panose="02070309020205020404" pitchFamily="49" charset="0"/>
+                <a:cs typeface="Courier New" panose="02070309020205020404" pitchFamily="49" charset="0"/>
+              </a:rPr>
+              <a:t>    @OneToMany(mappedBy = "questionnaire", cascade = { </a:t>
             </a:r>
             <a:r>
               <a:rPr lang="en-GB" sz="1100" dirty="0" err="1">
                 <a:latin typeface="Courier New" panose="02070309020205020404" pitchFamily="49" charset="0"/>
                 <a:cs typeface="Courier New" panose="02070309020205020404" pitchFamily="49" charset="0"/>
               </a:rPr>
-              <a:t>serialVersionUID</a:t>
+              <a:t>CascadeType.PERSIST</a:t>
             </a:r>
             <a:r>
               <a:rPr lang="en-GB" sz="1100" dirty="0">
                 <a:latin typeface="Courier New" panose="02070309020205020404" pitchFamily="49" charset="0"/>
                 <a:cs typeface="Courier New" panose="02070309020205020404" pitchFamily="49" charset="0"/>
               </a:rPr>
-              <a:t> = 1L;</a:t>
-            </a:r>
-            <a:br>
+              <a:t> }, </a:t>
+            </a:r>
+            <a:r>
+              <a:rPr lang="en-GB" sz="1100" dirty="0" err="1">
+                <a:latin typeface="Courier New" panose="02070309020205020404" pitchFamily="49" charset="0"/>
+                <a:cs typeface="Courier New" panose="02070309020205020404" pitchFamily="49" charset="0"/>
+              </a:rPr>
+              <a:t>orphanRemoval</a:t>
+            </a:r>
+            <a:r>
               <a:rPr lang="en-GB" sz="1100" dirty="0">
                 <a:latin typeface="Courier New" panose="02070309020205020404" pitchFamily="49" charset="0"/>
                 <a:cs typeface="Courier New" panose="02070309020205020404" pitchFamily="49" charset="0"/>
               </a:rPr>
-            </a:br>
+              <a:t> = true)</a:t>
+            </a:r>
             <a:br>
               <a:rPr lang="en-GB" sz="1100" dirty="0">
                 <a:latin typeface="Courier New" panose="02070309020205020404" pitchFamily="49" charset="0"/>
@@ -5140,7 +5180,7 @@
                 <a:latin typeface="Courier New" panose="02070309020205020404" pitchFamily="49" charset="0"/>
                 <a:cs typeface="Courier New" panose="02070309020205020404" pitchFamily="49" charset="0"/>
               </a:rPr>
-              <a:t>    @Id</a:t>
+              <a:t>    private List&lt;Question&gt; questions;</a:t>
             </a:r>
             <a:br>
               <a:rPr lang="en-GB" sz="1100" dirty="0">
@@ -5148,40 +5188,46 @@
                 <a:cs typeface="Courier New" panose="02070309020205020404" pitchFamily="49" charset="0"/>
               </a:rPr>
             </a:br>
-            <a:r>
+            <a:br>
               <a:rPr lang="en-GB" sz="1100" dirty="0">
                 <a:latin typeface="Courier New" panose="02070309020205020404" pitchFamily="49" charset="0"/>
                 <a:cs typeface="Courier New" panose="02070309020205020404" pitchFamily="49" charset="0"/>
               </a:rPr>
-              <a:t>    @</a:t>
+            </a:br>
+            <a:r>
+              <a:rPr lang="en-GB" sz="1100" dirty="0">
+                <a:latin typeface="Courier New" panose="02070309020205020404" pitchFamily="49" charset="0"/>
+                <a:cs typeface="Courier New" panose="02070309020205020404" pitchFamily="49" charset="0"/>
+              </a:rPr>
+              <a:t>    @OneToMany(mappedBy = "</a:t>
             </a:r>
             <a:r>
               <a:rPr lang="en-GB" sz="1100" dirty="0" err="1">
                 <a:latin typeface="Courier New" panose="02070309020205020404" pitchFamily="49" charset="0"/>
                 <a:cs typeface="Courier New" panose="02070309020205020404" pitchFamily="49" charset="0"/>
               </a:rPr>
-              <a:t>GeneratedValue</a:t>
+              <a:t>relatedQuestionnaire</a:t>
             </a:r>
             <a:r>
               <a:rPr lang="en-GB" sz="1100" dirty="0">
                 <a:latin typeface="Courier New" panose="02070309020205020404" pitchFamily="49" charset="0"/>
                 <a:cs typeface="Courier New" panose="02070309020205020404" pitchFamily="49" charset="0"/>
               </a:rPr>
-              <a:t>(strategy = </a:t>
+              <a:t>", cascade = {</a:t>
             </a:r>
             <a:r>
               <a:rPr lang="en-GB" sz="1100" dirty="0" err="1">
                 <a:latin typeface="Courier New" panose="02070309020205020404" pitchFamily="49" charset="0"/>
                 <a:cs typeface="Courier New" panose="02070309020205020404" pitchFamily="49" charset="0"/>
               </a:rPr>
-              <a:t>GenerationType.IDENTITY</a:t>
+              <a:t>CascadeType.REFRESH</a:t>
             </a:r>
             <a:r>
               <a:rPr lang="en-GB" sz="1100" dirty="0">
                 <a:latin typeface="Courier New" panose="02070309020205020404" pitchFamily="49" charset="0"/>
                 <a:cs typeface="Courier New" panose="02070309020205020404" pitchFamily="49" charset="0"/>
               </a:rPr>
-              <a:t>)</a:t>
+              <a:t>})</a:t>
             </a:r>
             <a:br>
               <a:rPr lang="en-GB" sz="1100" dirty="0">
@@ -5194,327 +5240,7 @@
                 <a:latin typeface="Courier New" panose="02070309020205020404" pitchFamily="49" charset="0"/>
                 <a:cs typeface="Courier New" panose="02070309020205020404" pitchFamily="49" charset="0"/>
               </a:rPr>
-              <a:t>    private int id;</a:t>
-            </a:r>
-            <a:br>
-              <a:rPr lang="en-GB" sz="1100" dirty="0">
-                <a:latin typeface="Courier New" panose="02070309020205020404" pitchFamily="49" charset="0"/>
-                <a:cs typeface="Courier New" panose="02070309020205020404" pitchFamily="49" charset="0"/>
-              </a:rPr>
-            </a:br>
-            <a:br>
-              <a:rPr lang="en-GB" sz="1100" dirty="0">
-                <a:latin typeface="Courier New" panose="02070309020205020404" pitchFamily="49" charset="0"/>
-                <a:cs typeface="Courier New" panose="02070309020205020404" pitchFamily="49" charset="0"/>
-              </a:rPr>
-            </a:br>
-            <a:r>
-              <a:rPr lang="en-GB" sz="1100" dirty="0">
-                <a:latin typeface="Courier New" panose="02070309020205020404" pitchFamily="49" charset="0"/>
-                <a:cs typeface="Courier New" panose="02070309020205020404" pitchFamily="49" charset="0"/>
-              </a:rPr>
-              <a:t>    @</a:t>
-            </a:r>
-            <a:r>
-              <a:rPr lang="en-GB" sz="1100" dirty="0" err="1">
-                <a:latin typeface="Courier New" panose="02070309020205020404" pitchFamily="49" charset="0"/>
-                <a:cs typeface="Courier New" panose="02070309020205020404" pitchFamily="49" charset="0"/>
-              </a:rPr>
-              <a:t>OneToOne</a:t>
-            </a:r>
-            <a:r>
-              <a:rPr lang="en-GB" sz="1100" dirty="0">
-                <a:latin typeface="Courier New" panose="02070309020205020404" pitchFamily="49" charset="0"/>
-                <a:cs typeface="Courier New" panose="02070309020205020404" pitchFamily="49" charset="0"/>
-              </a:rPr>
-              <a:t>(fetch = </a:t>
-            </a:r>
-            <a:r>
-              <a:rPr lang="en-GB" sz="1100" dirty="0" err="1">
-                <a:latin typeface="Courier New" panose="02070309020205020404" pitchFamily="49" charset="0"/>
-                <a:cs typeface="Courier New" panose="02070309020205020404" pitchFamily="49" charset="0"/>
-              </a:rPr>
-              <a:t>FetchType.EAGER</a:t>
-            </a:r>
-            <a:r>
-              <a:rPr lang="en-GB" sz="1100" dirty="0">
-                <a:latin typeface="Courier New" panose="02070309020205020404" pitchFamily="49" charset="0"/>
-                <a:cs typeface="Courier New" panose="02070309020205020404" pitchFamily="49" charset="0"/>
-              </a:rPr>
-              <a:t>, </a:t>
-            </a:r>
-            <a:r>
-              <a:rPr lang="en-GB" sz="1100" dirty="0" err="1">
-                <a:latin typeface="Courier New" panose="02070309020205020404" pitchFamily="49" charset="0"/>
-                <a:cs typeface="Courier New" panose="02070309020205020404" pitchFamily="49" charset="0"/>
-              </a:rPr>
-              <a:t>orphanRemoval</a:t>
-            </a:r>
-            <a:r>
-              <a:rPr lang="en-GB" sz="1100" dirty="0">
-                <a:latin typeface="Courier New" panose="02070309020205020404" pitchFamily="49" charset="0"/>
-                <a:cs typeface="Courier New" panose="02070309020205020404" pitchFamily="49" charset="0"/>
-              </a:rPr>
-              <a:t> = true, cascade = { </a:t>
-            </a:r>
-            <a:r>
-              <a:rPr lang="en-GB" sz="1100" dirty="0" err="1">
-                <a:latin typeface="Courier New" panose="02070309020205020404" pitchFamily="49" charset="0"/>
-                <a:cs typeface="Courier New" panose="02070309020205020404" pitchFamily="49" charset="0"/>
-              </a:rPr>
-              <a:t>CascadeType.PERSIST</a:t>
-            </a:r>
-            <a:r>
-              <a:rPr lang="en-GB" sz="1100" dirty="0">
-                <a:latin typeface="Courier New" panose="02070309020205020404" pitchFamily="49" charset="0"/>
-                <a:cs typeface="Courier New" panose="02070309020205020404" pitchFamily="49" charset="0"/>
-              </a:rPr>
-              <a:t>, </a:t>
-            </a:r>
-            <a:r>
-              <a:rPr lang="en-GB" sz="1100" dirty="0" err="1">
-                <a:latin typeface="Courier New" panose="02070309020205020404" pitchFamily="49" charset="0"/>
-                <a:cs typeface="Courier New" panose="02070309020205020404" pitchFamily="49" charset="0"/>
-              </a:rPr>
-              <a:t>CascadeType.REMOVE</a:t>
-            </a:r>
-            <a:r>
-              <a:rPr lang="en-GB" sz="1100" dirty="0">
-                <a:latin typeface="Courier New" panose="02070309020205020404" pitchFamily="49" charset="0"/>
-                <a:cs typeface="Courier New" panose="02070309020205020404" pitchFamily="49" charset="0"/>
-              </a:rPr>
-              <a:t> })</a:t>
-            </a:r>
-            <a:br>
-              <a:rPr lang="en-GB" sz="1100" dirty="0">
-                <a:latin typeface="Courier New" panose="02070309020205020404" pitchFamily="49" charset="0"/>
-                <a:cs typeface="Courier New" panose="02070309020205020404" pitchFamily="49" charset="0"/>
-              </a:rPr>
-            </a:br>
-            <a:r>
-              <a:rPr lang="en-GB" sz="1100" dirty="0">
-                <a:latin typeface="Courier New" panose="02070309020205020404" pitchFamily="49" charset="0"/>
-                <a:cs typeface="Courier New" panose="02070309020205020404" pitchFamily="49" charset="0"/>
-              </a:rPr>
-              <a:t>    private Product </a:t>
-            </a:r>
-            <a:r>
-              <a:rPr lang="en-GB" sz="1100" dirty="0" err="1">
-                <a:latin typeface="Courier New" panose="02070309020205020404" pitchFamily="49" charset="0"/>
-                <a:cs typeface="Courier New" panose="02070309020205020404" pitchFamily="49" charset="0"/>
-              </a:rPr>
-              <a:t>relatedProduct</a:t>
-            </a:r>
-            <a:r>
-              <a:rPr lang="en-GB" sz="1100" dirty="0">
-                <a:latin typeface="Courier New" panose="02070309020205020404" pitchFamily="49" charset="0"/>
-                <a:cs typeface="Courier New" panose="02070309020205020404" pitchFamily="49" charset="0"/>
-              </a:rPr>
-              <a:t>;</a:t>
-            </a:r>
-            <a:br>
-              <a:rPr lang="en-GB" sz="1100" dirty="0">
-                <a:latin typeface="Courier New" panose="02070309020205020404" pitchFamily="49" charset="0"/>
-                <a:cs typeface="Courier New" panose="02070309020205020404" pitchFamily="49" charset="0"/>
-              </a:rPr>
-            </a:br>
-            <a:br>
-              <a:rPr lang="en-GB" sz="1100" dirty="0">
-                <a:latin typeface="Courier New" panose="02070309020205020404" pitchFamily="49" charset="0"/>
-                <a:cs typeface="Courier New" panose="02070309020205020404" pitchFamily="49" charset="0"/>
-              </a:rPr>
-            </a:br>
-            <a:r>
-              <a:rPr lang="en-GB" sz="1100" dirty="0">
-                <a:latin typeface="Courier New" panose="02070309020205020404" pitchFamily="49" charset="0"/>
-                <a:cs typeface="Courier New" panose="02070309020205020404" pitchFamily="49" charset="0"/>
-              </a:rPr>
-              <a:t>    @</a:t>
-            </a:r>
-            <a:r>
-              <a:rPr lang="en-GB" sz="1100" dirty="0" err="1">
-                <a:latin typeface="Courier New" panose="02070309020205020404" pitchFamily="49" charset="0"/>
-                <a:cs typeface="Courier New" panose="02070309020205020404" pitchFamily="49" charset="0"/>
-              </a:rPr>
-              <a:t>OneToMany</a:t>
-            </a:r>
-            <a:r>
-              <a:rPr lang="en-GB" sz="1100" dirty="0">
-                <a:latin typeface="Courier New" panose="02070309020205020404" pitchFamily="49" charset="0"/>
-                <a:cs typeface="Courier New" panose="02070309020205020404" pitchFamily="49" charset="0"/>
-              </a:rPr>
-              <a:t>(</a:t>
-            </a:r>
-            <a:r>
-              <a:rPr lang="en-GB" sz="1100" dirty="0" err="1">
-                <a:latin typeface="Courier New" panose="02070309020205020404" pitchFamily="49" charset="0"/>
-                <a:cs typeface="Courier New" panose="02070309020205020404" pitchFamily="49" charset="0"/>
-              </a:rPr>
-              <a:t>mappedBy</a:t>
-            </a:r>
-            <a:r>
-              <a:rPr lang="en-GB" sz="1100" dirty="0">
-                <a:latin typeface="Courier New" panose="02070309020205020404" pitchFamily="49" charset="0"/>
-                <a:cs typeface="Courier New" panose="02070309020205020404" pitchFamily="49" charset="0"/>
-              </a:rPr>
-              <a:t> = "questionnaire", cascade = { </a:t>
-            </a:r>
-            <a:r>
-              <a:rPr lang="en-GB" sz="1100" dirty="0" err="1">
-                <a:latin typeface="Courier New" panose="02070309020205020404" pitchFamily="49" charset="0"/>
-                <a:cs typeface="Courier New" panose="02070309020205020404" pitchFamily="49" charset="0"/>
-              </a:rPr>
-              <a:t>CascadeType.PERSIST</a:t>
-            </a:r>
-            <a:r>
-              <a:rPr lang="en-GB" sz="1100" dirty="0">
-                <a:latin typeface="Courier New" panose="02070309020205020404" pitchFamily="49" charset="0"/>
-                <a:cs typeface="Courier New" panose="02070309020205020404" pitchFamily="49" charset="0"/>
-              </a:rPr>
-              <a:t> }, </a:t>
-            </a:r>
-            <a:r>
-              <a:rPr lang="en-GB" sz="1100" dirty="0" err="1">
-                <a:latin typeface="Courier New" panose="02070309020205020404" pitchFamily="49" charset="0"/>
-                <a:cs typeface="Courier New" panose="02070309020205020404" pitchFamily="49" charset="0"/>
-              </a:rPr>
-              <a:t>orphanRemoval</a:t>
-            </a:r>
-            <a:r>
-              <a:rPr lang="en-GB" sz="1100" dirty="0">
-                <a:latin typeface="Courier New" panose="02070309020205020404" pitchFamily="49" charset="0"/>
-                <a:cs typeface="Courier New" panose="02070309020205020404" pitchFamily="49" charset="0"/>
-              </a:rPr>
-              <a:t> = true)</a:t>
-            </a:r>
-            <a:br>
-              <a:rPr lang="en-GB" sz="1100" dirty="0">
-                <a:latin typeface="Courier New" panose="02070309020205020404" pitchFamily="49" charset="0"/>
-                <a:cs typeface="Courier New" panose="02070309020205020404" pitchFamily="49" charset="0"/>
-              </a:rPr>
-            </a:br>
-            <a:r>
-              <a:rPr lang="en-GB" sz="1100" dirty="0">
-                <a:latin typeface="Courier New" panose="02070309020205020404" pitchFamily="49" charset="0"/>
-                <a:cs typeface="Courier New" panose="02070309020205020404" pitchFamily="49" charset="0"/>
-              </a:rPr>
-              <a:t>    private List&lt;Question&gt; questions;</a:t>
-            </a:r>
-            <a:br>
-              <a:rPr lang="en-GB" sz="1100" dirty="0">
-                <a:latin typeface="Courier New" panose="02070309020205020404" pitchFamily="49" charset="0"/>
-                <a:cs typeface="Courier New" panose="02070309020205020404" pitchFamily="49" charset="0"/>
-              </a:rPr>
-            </a:br>
-            <a:br>
-              <a:rPr lang="en-GB" sz="1100" dirty="0">
-                <a:latin typeface="Courier New" panose="02070309020205020404" pitchFamily="49" charset="0"/>
-                <a:cs typeface="Courier New" panose="02070309020205020404" pitchFamily="49" charset="0"/>
-              </a:rPr>
-            </a:br>
-            <a:r>
-              <a:rPr lang="en-GB" sz="1100" dirty="0">
-                <a:latin typeface="Courier New" panose="02070309020205020404" pitchFamily="49" charset="0"/>
-                <a:cs typeface="Courier New" panose="02070309020205020404" pitchFamily="49" charset="0"/>
-              </a:rPr>
-              <a:t>    @</a:t>
-            </a:r>
-            <a:r>
-              <a:rPr lang="en-GB" sz="1100" dirty="0" err="1">
-                <a:latin typeface="Courier New" panose="02070309020205020404" pitchFamily="49" charset="0"/>
-                <a:cs typeface="Courier New" panose="02070309020205020404" pitchFamily="49" charset="0"/>
-              </a:rPr>
-              <a:t>OneToMany</a:t>
-            </a:r>
-            <a:r>
-              <a:rPr lang="en-GB" sz="1100" dirty="0">
-                <a:latin typeface="Courier New" panose="02070309020205020404" pitchFamily="49" charset="0"/>
-                <a:cs typeface="Courier New" panose="02070309020205020404" pitchFamily="49" charset="0"/>
-              </a:rPr>
-              <a:t>(</a:t>
-            </a:r>
-            <a:r>
-              <a:rPr lang="en-GB" sz="1100" dirty="0" err="1">
-                <a:latin typeface="Courier New" panose="02070309020205020404" pitchFamily="49" charset="0"/>
-                <a:cs typeface="Courier New" panose="02070309020205020404" pitchFamily="49" charset="0"/>
-              </a:rPr>
-              <a:t>mappedBy</a:t>
-            </a:r>
-            <a:r>
-              <a:rPr lang="en-GB" sz="1100" dirty="0">
-                <a:latin typeface="Courier New" panose="02070309020205020404" pitchFamily="49" charset="0"/>
-                <a:cs typeface="Courier New" panose="02070309020205020404" pitchFamily="49" charset="0"/>
-              </a:rPr>
-              <a:t> = "</a:t>
-            </a:r>
-            <a:r>
-              <a:rPr lang="en-GB" sz="1100" dirty="0" err="1">
-                <a:latin typeface="Courier New" panose="02070309020205020404" pitchFamily="49" charset="0"/>
-                <a:cs typeface="Courier New" panose="02070309020205020404" pitchFamily="49" charset="0"/>
-              </a:rPr>
-              <a:t>relatedQuestionnaire</a:t>
-            </a:r>
-            <a:r>
-              <a:rPr lang="en-GB" sz="1100" dirty="0">
-                <a:latin typeface="Courier New" panose="02070309020205020404" pitchFamily="49" charset="0"/>
-                <a:cs typeface="Courier New" panose="02070309020205020404" pitchFamily="49" charset="0"/>
-              </a:rPr>
-              <a:t>", cascade = {</a:t>
-            </a:r>
-            <a:r>
-              <a:rPr lang="en-GB" sz="1100" dirty="0" err="1">
-                <a:latin typeface="Courier New" panose="02070309020205020404" pitchFamily="49" charset="0"/>
-                <a:cs typeface="Courier New" panose="02070309020205020404" pitchFamily="49" charset="0"/>
-              </a:rPr>
-              <a:t>CascadeType.REFRESH</a:t>
-            </a:r>
-            <a:r>
-              <a:rPr lang="en-GB" sz="1100" dirty="0">
-                <a:latin typeface="Courier New" panose="02070309020205020404" pitchFamily="49" charset="0"/>
-                <a:cs typeface="Courier New" panose="02070309020205020404" pitchFamily="49" charset="0"/>
-              </a:rPr>
-              <a:t>})</a:t>
-            </a:r>
-            <a:br>
-              <a:rPr lang="en-GB" sz="1100" dirty="0">
-                <a:latin typeface="Courier New" panose="02070309020205020404" pitchFamily="49" charset="0"/>
-                <a:cs typeface="Courier New" panose="02070309020205020404" pitchFamily="49" charset="0"/>
-              </a:rPr>
-            </a:br>
-            <a:r>
-              <a:rPr lang="en-GB" sz="1100" dirty="0">
-                <a:latin typeface="Courier New" panose="02070309020205020404" pitchFamily="49" charset="0"/>
-                <a:cs typeface="Courier New" panose="02070309020205020404" pitchFamily="49" charset="0"/>
-              </a:rPr>
-              <a:t>    @</a:t>
-            </a:r>
-            <a:r>
-              <a:rPr lang="en-GB" sz="1100" dirty="0" err="1">
-                <a:latin typeface="Courier New" panose="02070309020205020404" pitchFamily="49" charset="0"/>
-                <a:cs typeface="Courier New" panose="02070309020205020404" pitchFamily="49" charset="0"/>
-              </a:rPr>
-              <a:t>OrderBy</a:t>
-            </a:r>
-            <a:r>
-              <a:rPr lang="en-GB" sz="1100" dirty="0">
-                <a:latin typeface="Courier New" panose="02070309020205020404" pitchFamily="49" charset="0"/>
-                <a:cs typeface="Courier New" panose="02070309020205020404" pitchFamily="49" charset="0"/>
-              </a:rPr>
-              <a:t>("</a:t>
-            </a:r>
-            <a:r>
-              <a:rPr lang="en-GB" sz="1100" dirty="0" err="1">
-                <a:latin typeface="Courier New" panose="02070309020205020404" pitchFamily="49" charset="0"/>
-                <a:cs typeface="Courier New" panose="02070309020205020404" pitchFamily="49" charset="0"/>
-              </a:rPr>
-              <a:t>pointsEarned</a:t>
-            </a:r>
-            <a:r>
-              <a:rPr lang="en-GB" sz="1100" dirty="0">
-                <a:latin typeface="Courier New" panose="02070309020205020404" pitchFamily="49" charset="0"/>
-                <a:cs typeface="Courier New" panose="02070309020205020404" pitchFamily="49" charset="0"/>
-              </a:rPr>
-              <a:t> DESC")</a:t>
+              <a:t>    @OrderBy("pointsEarned DESC")</a:t>
             </a:r>
             <a:br>
               <a:rPr lang="en-GB" sz="1100" dirty="0">
@@ -7800,461 +7526,366 @@
                 <a:latin typeface="Courier New" panose="02070309020205020404" pitchFamily="49" charset="0"/>
                 <a:cs typeface="Courier New" panose="02070309020205020404" pitchFamily="49" charset="0"/>
               </a:rPr>
-              <a:t>@</a:t>
+              <a:t>@NamedQuery(name = "</a:t>
             </a:r>
             <a:r>
               <a:rPr lang="en-GB" sz="1200" dirty="0" err="1">
                 <a:latin typeface="Courier New" panose="02070309020205020404" pitchFamily="49" charset="0"/>
                 <a:cs typeface="Courier New" panose="02070309020205020404" pitchFamily="49" charset="0"/>
               </a:rPr>
-              <a:t>NamedQuery</a:t>
-            </a:r>
-            <a:r>
-              <a:rPr lang="en-GB" sz="1200" dirty="0">
-                <a:latin typeface="Courier New" panose="02070309020205020404" pitchFamily="49" charset="0"/>
-                <a:cs typeface="Courier New" panose="02070309020205020404" pitchFamily="49" charset="0"/>
-              </a:rPr>
-              <a:t>(name = "</a:t>
+              <a:t>User.checkCredentials</a:t>
+            </a:r>
+            <a:r>
+              <a:rPr lang="en-GB" sz="1200" dirty="0">
+                <a:latin typeface="Courier New" panose="02070309020205020404" pitchFamily="49" charset="0"/>
+                <a:cs typeface="Courier New" panose="02070309020205020404" pitchFamily="49" charset="0"/>
+              </a:rPr>
+              <a:t>", query = "SELECT r FROM User r  WHERE (</a:t>
             </a:r>
             <a:r>
               <a:rPr lang="en-GB" sz="1200" dirty="0" err="1">
                 <a:latin typeface="Courier New" panose="02070309020205020404" pitchFamily="49" charset="0"/>
                 <a:cs typeface="Courier New" panose="02070309020205020404" pitchFamily="49" charset="0"/>
               </a:rPr>
-              <a:t>User.checkCredentials</a:t>
-            </a:r>
-            <a:r>
-              <a:rPr lang="en-GB" sz="1200" dirty="0">
-                <a:latin typeface="Courier New" panose="02070309020205020404" pitchFamily="49" charset="0"/>
-                <a:cs typeface="Courier New" panose="02070309020205020404" pitchFamily="49" charset="0"/>
-              </a:rPr>
-              <a:t>", query = "SELECT r FROM User r  WHERE (</a:t>
+              <a:t>r.username</a:t>
+            </a:r>
+            <a:r>
+              <a:rPr lang="en-GB" sz="1200" dirty="0">
+                <a:latin typeface="Courier New" panose="02070309020205020404" pitchFamily="49" charset="0"/>
+                <a:cs typeface="Courier New" panose="02070309020205020404" pitchFamily="49" charset="0"/>
+              </a:rPr>
+              <a:t> = ?1 or </a:t>
             </a:r>
             <a:r>
               <a:rPr lang="en-GB" sz="1200" dirty="0" err="1">
                 <a:latin typeface="Courier New" panose="02070309020205020404" pitchFamily="49" charset="0"/>
                 <a:cs typeface="Courier New" panose="02070309020205020404" pitchFamily="49" charset="0"/>
               </a:rPr>
-              <a:t>r.username</a:t>
-            </a:r>
-            <a:r>
-              <a:rPr lang="en-GB" sz="1200" dirty="0">
-                <a:latin typeface="Courier New" panose="02070309020205020404" pitchFamily="49" charset="0"/>
-                <a:cs typeface="Courier New" panose="02070309020205020404" pitchFamily="49" charset="0"/>
-              </a:rPr>
-              <a:t> = ?1 or </a:t>
+              <a:t>r.email</a:t>
+            </a:r>
+            <a:r>
+              <a:rPr lang="en-GB" sz="1200" dirty="0">
+                <a:latin typeface="Courier New" panose="02070309020205020404" pitchFamily="49" charset="0"/>
+                <a:cs typeface="Courier New" panose="02070309020205020404" pitchFamily="49" charset="0"/>
+              </a:rPr>
+              <a:t> = ?1) and </a:t>
             </a:r>
             <a:r>
               <a:rPr lang="en-GB" sz="1200" dirty="0" err="1">
                 <a:latin typeface="Courier New" panose="02070309020205020404" pitchFamily="49" charset="0"/>
                 <a:cs typeface="Courier New" panose="02070309020205020404" pitchFamily="49" charset="0"/>
               </a:rPr>
-              <a:t>r.email</a:t>
-            </a:r>
-            <a:r>
-              <a:rPr lang="en-GB" sz="1200" dirty="0">
-                <a:latin typeface="Courier New" panose="02070309020205020404" pitchFamily="49" charset="0"/>
-                <a:cs typeface="Courier New" panose="02070309020205020404" pitchFamily="49" charset="0"/>
-              </a:rPr>
-              <a:t> = ?1) and </a:t>
+              <a:t>r.password</a:t>
+            </a:r>
+            <a:r>
+              <a:rPr lang="en-GB" sz="1200" dirty="0">
+                <a:latin typeface="Courier New" panose="02070309020205020404" pitchFamily="49" charset="0"/>
+                <a:cs typeface="Courier New" panose="02070309020205020404" pitchFamily="49" charset="0"/>
+              </a:rPr>
+              <a:t> = ?2")</a:t>
+            </a:r>
+            <a:br>
+              <a:rPr lang="en-GB" sz="1200" dirty="0">
+                <a:latin typeface="Courier New" panose="02070309020205020404" pitchFamily="49" charset="0"/>
+                <a:cs typeface="Courier New" panose="02070309020205020404" pitchFamily="49" charset="0"/>
+              </a:rPr>
+            </a:br>
+            <a:r>
+              <a:rPr lang="en-GB" sz="1200" dirty="0">
+                <a:latin typeface="Courier New" panose="02070309020205020404" pitchFamily="49" charset="0"/>
+                <a:cs typeface="Courier New" panose="02070309020205020404" pitchFamily="49" charset="0"/>
+              </a:rPr>
+              <a:t>public class User implements Serializable {</a:t>
+            </a:r>
+            <a:br>
+              <a:rPr lang="en-GB" sz="1200" dirty="0">
+                <a:latin typeface="Courier New" panose="02070309020205020404" pitchFamily="49" charset="0"/>
+                <a:cs typeface="Courier New" panose="02070309020205020404" pitchFamily="49" charset="0"/>
+              </a:rPr>
+            </a:br>
+            <a:r>
+              <a:rPr lang="en-GB" sz="1200" dirty="0">
+                <a:latin typeface="Courier New" panose="02070309020205020404" pitchFamily="49" charset="0"/>
+                <a:cs typeface="Courier New" panose="02070309020205020404" pitchFamily="49" charset="0"/>
+              </a:rPr>
+              <a:t>    private static final long </a:t>
             </a:r>
             <a:r>
               <a:rPr lang="en-GB" sz="1200" dirty="0" err="1">
                 <a:latin typeface="Courier New" panose="02070309020205020404" pitchFamily="49" charset="0"/>
                 <a:cs typeface="Courier New" panose="02070309020205020404" pitchFamily="49" charset="0"/>
               </a:rPr>
-              <a:t>r.password</a:t>
-            </a:r>
-            <a:r>
-              <a:rPr lang="en-GB" sz="1200" dirty="0">
-                <a:latin typeface="Courier New" panose="02070309020205020404" pitchFamily="49" charset="0"/>
-                <a:cs typeface="Courier New" panose="02070309020205020404" pitchFamily="49" charset="0"/>
-              </a:rPr>
-              <a:t> = ?2")</a:t>
-            </a:r>
-            <a:br>
-              <a:rPr lang="en-GB" sz="1200" dirty="0">
-                <a:latin typeface="Courier New" panose="02070309020205020404" pitchFamily="49" charset="0"/>
-                <a:cs typeface="Courier New" panose="02070309020205020404" pitchFamily="49" charset="0"/>
-              </a:rPr>
-            </a:br>
-            <a:r>
-              <a:rPr lang="en-GB" sz="1200" dirty="0">
-                <a:latin typeface="Courier New" panose="02070309020205020404" pitchFamily="49" charset="0"/>
-                <a:cs typeface="Courier New" panose="02070309020205020404" pitchFamily="49" charset="0"/>
-              </a:rPr>
-              <a:t>public class User implements Serializable {</a:t>
-            </a:r>
-            <a:br>
-              <a:rPr lang="en-GB" sz="1200" dirty="0">
-                <a:latin typeface="Courier New" panose="02070309020205020404" pitchFamily="49" charset="0"/>
-                <a:cs typeface="Courier New" panose="02070309020205020404" pitchFamily="49" charset="0"/>
-              </a:rPr>
-            </a:br>
-            <a:r>
-              <a:rPr lang="en-GB" sz="1200" dirty="0">
-                <a:latin typeface="Courier New" panose="02070309020205020404" pitchFamily="49" charset="0"/>
-                <a:cs typeface="Courier New" panose="02070309020205020404" pitchFamily="49" charset="0"/>
-              </a:rPr>
-              <a:t>    private static final long </a:t>
+              <a:t>serialVersionUID</a:t>
+            </a:r>
+            <a:r>
+              <a:rPr lang="en-GB" sz="1200" dirty="0">
+                <a:latin typeface="Courier New" panose="02070309020205020404" pitchFamily="49" charset="0"/>
+                <a:cs typeface="Courier New" panose="02070309020205020404" pitchFamily="49" charset="0"/>
+              </a:rPr>
+              <a:t> = 1L;</a:t>
+            </a:r>
+            <a:br>
+              <a:rPr lang="en-GB" sz="1200" dirty="0">
+                <a:latin typeface="Courier New" panose="02070309020205020404" pitchFamily="49" charset="0"/>
+                <a:cs typeface="Courier New" panose="02070309020205020404" pitchFamily="49" charset="0"/>
+              </a:rPr>
+            </a:br>
+            <a:br>
+              <a:rPr lang="en-GB" sz="1200" dirty="0">
+                <a:latin typeface="Courier New" panose="02070309020205020404" pitchFamily="49" charset="0"/>
+                <a:cs typeface="Courier New" panose="02070309020205020404" pitchFamily="49" charset="0"/>
+              </a:rPr>
+            </a:br>
+            <a:r>
+              <a:rPr lang="en-GB" sz="1200" dirty="0">
+                <a:latin typeface="Courier New" panose="02070309020205020404" pitchFamily="49" charset="0"/>
+                <a:cs typeface="Courier New" panose="02070309020205020404" pitchFamily="49" charset="0"/>
+              </a:rPr>
+              <a:t>    @Id</a:t>
+            </a:r>
+            <a:br>
+              <a:rPr lang="en-GB" sz="1200" dirty="0">
+                <a:latin typeface="Courier New" panose="02070309020205020404" pitchFamily="49" charset="0"/>
+                <a:cs typeface="Courier New" panose="02070309020205020404" pitchFamily="49" charset="0"/>
+              </a:rPr>
+            </a:br>
+            <a:r>
+              <a:rPr lang="en-GB" sz="1200" dirty="0">
+                <a:latin typeface="Courier New" panose="02070309020205020404" pitchFamily="49" charset="0"/>
+                <a:cs typeface="Courier New" panose="02070309020205020404" pitchFamily="49" charset="0"/>
+              </a:rPr>
+              <a:t>    @GeneratedValue(strategy = </a:t>
             </a:r>
             <a:r>
               <a:rPr lang="en-GB" sz="1200" dirty="0" err="1">
                 <a:latin typeface="Courier New" panose="02070309020205020404" pitchFamily="49" charset="0"/>
                 <a:cs typeface="Courier New" panose="02070309020205020404" pitchFamily="49" charset="0"/>
               </a:rPr>
-              <a:t>serialVersionUID</a:t>
-            </a:r>
-            <a:r>
-              <a:rPr lang="en-GB" sz="1200" dirty="0">
-                <a:latin typeface="Courier New" panose="02070309020205020404" pitchFamily="49" charset="0"/>
-                <a:cs typeface="Courier New" panose="02070309020205020404" pitchFamily="49" charset="0"/>
-              </a:rPr>
-              <a:t> = 1L;</a:t>
-            </a:r>
-            <a:br>
-              <a:rPr lang="en-GB" sz="1200" dirty="0">
-                <a:latin typeface="Courier New" panose="02070309020205020404" pitchFamily="49" charset="0"/>
-                <a:cs typeface="Courier New" panose="02070309020205020404" pitchFamily="49" charset="0"/>
-              </a:rPr>
-            </a:br>
-            <a:br>
-              <a:rPr lang="en-GB" sz="1200" dirty="0">
-                <a:latin typeface="Courier New" panose="02070309020205020404" pitchFamily="49" charset="0"/>
-                <a:cs typeface="Courier New" panose="02070309020205020404" pitchFamily="49" charset="0"/>
-              </a:rPr>
-            </a:br>
-            <a:r>
-              <a:rPr lang="en-GB" sz="1200" dirty="0">
-                <a:latin typeface="Courier New" panose="02070309020205020404" pitchFamily="49" charset="0"/>
-                <a:cs typeface="Courier New" panose="02070309020205020404" pitchFamily="49" charset="0"/>
-              </a:rPr>
-              <a:t>    @Id</a:t>
-            </a:r>
-            <a:br>
-              <a:rPr lang="en-GB" sz="1200" dirty="0">
-                <a:latin typeface="Courier New" panose="02070309020205020404" pitchFamily="49" charset="0"/>
-                <a:cs typeface="Courier New" panose="02070309020205020404" pitchFamily="49" charset="0"/>
-              </a:rPr>
-            </a:br>
-            <a:r>
-              <a:rPr lang="en-GB" sz="1200" dirty="0">
-                <a:latin typeface="Courier New" panose="02070309020205020404" pitchFamily="49" charset="0"/>
-                <a:cs typeface="Courier New" panose="02070309020205020404" pitchFamily="49" charset="0"/>
-              </a:rPr>
-              <a:t>    @</a:t>
+              <a:t>GenerationType.IDENTITY</a:t>
+            </a:r>
+            <a:r>
+              <a:rPr lang="en-GB" sz="1200" dirty="0">
+                <a:latin typeface="Courier New" panose="02070309020205020404" pitchFamily="49" charset="0"/>
+                <a:cs typeface="Courier New" panose="02070309020205020404" pitchFamily="49" charset="0"/>
+              </a:rPr>
+              <a:t>)</a:t>
+            </a:r>
+            <a:br>
+              <a:rPr lang="en-GB" sz="1200" dirty="0">
+                <a:latin typeface="Courier New" panose="02070309020205020404" pitchFamily="49" charset="0"/>
+                <a:cs typeface="Courier New" panose="02070309020205020404" pitchFamily="49" charset="0"/>
+              </a:rPr>
+            </a:br>
+            <a:r>
+              <a:rPr lang="en-GB" sz="1200" dirty="0">
+                <a:latin typeface="Courier New" panose="02070309020205020404" pitchFamily="49" charset="0"/>
+                <a:cs typeface="Courier New" panose="02070309020205020404" pitchFamily="49" charset="0"/>
+              </a:rPr>
+              <a:t>    private int id;</a:t>
+            </a:r>
+            <a:br>
+              <a:rPr lang="en-GB" sz="1200" dirty="0">
+                <a:latin typeface="Courier New" panose="02070309020205020404" pitchFamily="49" charset="0"/>
+                <a:cs typeface="Courier New" panose="02070309020205020404" pitchFamily="49" charset="0"/>
+              </a:rPr>
+            </a:br>
+            <a:r>
+              <a:rPr lang="en-GB" sz="1200" dirty="0">
+                <a:latin typeface="Courier New" panose="02070309020205020404" pitchFamily="49" charset="0"/>
+                <a:cs typeface="Courier New" panose="02070309020205020404" pitchFamily="49" charset="0"/>
+              </a:rPr>
+              <a:t>    @Column(unique = true)</a:t>
+            </a:r>
+            <a:br>
+              <a:rPr lang="en-GB" sz="1200" dirty="0">
+                <a:latin typeface="Courier New" panose="02070309020205020404" pitchFamily="49" charset="0"/>
+                <a:cs typeface="Courier New" panose="02070309020205020404" pitchFamily="49" charset="0"/>
+              </a:rPr>
+            </a:br>
+            <a:r>
+              <a:rPr lang="en-GB" sz="1200" dirty="0">
+                <a:latin typeface="Courier New" panose="02070309020205020404" pitchFamily="49" charset="0"/>
+                <a:cs typeface="Courier New" panose="02070309020205020404" pitchFamily="49" charset="0"/>
+              </a:rPr>
+              <a:t>    private String username;</a:t>
+            </a:r>
+            <a:br>
+              <a:rPr lang="en-GB" sz="1200" dirty="0">
+                <a:latin typeface="Courier New" panose="02070309020205020404" pitchFamily="49" charset="0"/>
+                <a:cs typeface="Courier New" panose="02070309020205020404" pitchFamily="49" charset="0"/>
+              </a:rPr>
+            </a:br>
+            <a:r>
+              <a:rPr lang="en-GB" sz="1200" dirty="0">
+                <a:latin typeface="Courier New" panose="02070309020205020404" pitchFamily="49" charset="0"/>
+                <a:cs typeface="Courier New" panose="02070309020205020404" pitchFamily="49" charset="0"/>
+              </a:rPr>
+              <a:t>    @Column(unique = true)</a:t>
+            </a:r>
+            <a:br>
+              <a:rPr lang="en-GB" sz="1200" dirty="0">
+                <a:latin typeface="Courier New" panose="02070309020205020404" pitchFamily="49" charset="0"/>
+                <a:cs typeface="Courier New" panose="02070309020205020404" pitchFamily="49" charset="0"/>
+              </a:rPr>
+            </a:br>
+            <a:r>
+              <a:rPr lang="en-GB" sz="1200" dirty="0">
+                <a:latin typeface="Courier New" panose="02070309020205020404" pitchFamily="49" charset="0"/>
+                <a:cs typeface="Courier New" panose="02070309020205020404" pitchFamily="49" charset="0"/>
+              </a:rPr>
+              <a:t>    private String email;</a:t>
+            </a:r>
+            <a:br>
+              <a:rPr lang="en-GB" sz="1200" dirty="0">
+                <a:latin typeface="Courier New" panose="02070309020205020404" pitchFamily="49" charset="0"/>
+                <a:cs typeface="Courier New" panose="02070309020205020404" pitchFamily="49" charset="0"/>
+              </a:rPr>
+            </a:br>
+            <a:br>
+              <a:rPr lang="en-GB" sz="1200" dirty="0">
+                <a:latin typeface="Courier New" panose="02070309020205020404" pitchFamily="49" charset="0"/>
+                <a:cs typeface="Courier New" panose="02070309020205020404" pitchFamily="49" charset="0"/>
+              </a:rPr>
+            </a:br>
+            <a:r>
+              <a:rPr lang="en-GB" sz="1200" dirty="0">
+                <a:latin typeface="Courier New" panose="02070309020205020404" pitchFamily="49" charset="0"/>
+                <a:cs typeface="Courier New" panose="02070309020205020404" pitchFamily="49" charset="0"/>
+              </a:rPr>
+              <a:t>    private String password;</a:t>
+            </a:r>
+            <a:br>
+              <a:rPr lang="en-GB" sz="1200" dirty="0">
+                <a:latin typeface="Courier New" panose="02070309020205020404" pitchFamily="49" charset="0"/>
+                <a:cs typeface="Courier New" panose="02070309020205020404" pitchFamily="49" charset="0"/>
+              </a:rPr>
+            </a:br>
+            <a:r>
+              <a:rPr lang="en-GB" sz="1200" dirty="0">
+                <a:latin typeface="Courier New" panose="02070309020205020404" pitchFamily="49" charset="0"/>
+                <a:cs typeface="Courier New" panose="02070309020205020404" pitchFamily="49" charset="0"/>
+              </a:rPr>
+              <a:t>    private String name;</a:t>
+            </a:r>
+            <a:br>
+              <a:rPr lang="en-GB" sz="1200" dirty="0">
+                <a:latin typeface="Courier New" panose="02070309020205020404" pitchFamily="49" charset="0"/>
+                <a:cs typeface="Courier New" panose="02070309020205020404" pitchFamily="49" charset="0"/>
+              </a:rPr>
+            </a:br>
+            <a:r>
+              <a:rPr lang="en-GB" sz="1200" dirty="0">
+                <a:latin typeface="Courier New" panose="02070309020205020404" pitchFamily="49" charset="0"/>
+                <a:cs typeface="Courier New" panose="02070309020205020404" pitchFamily="49" charset="0"/>
+              </a:rPr>
+              <a:t>    private String surname;</a:t>
+            </a:r>
+            <a:br>
+              <a:rPr lang="en-GB" sz="1200" dirty="0">
+                <a:latin typeface="Courier New" panose="02070309020205020404" pitchFamily="49" charset="0"/>
+                <a:cs typeface="Courier New" panose="02070309020205020404" pitchFamily="49" charset="0"/>
+              </a:rPr>
+            </a:br>
+            <a:r>
+              <a:rPr lang="en-GB" sz="1200" dirty="0">
+                <a:latin typeface="Courier New" panose="02070309020205020404" pitchFamily="49" charset="0"/>
+                <a:cs typeface="Courier New" panose="02070309020205020404" pitchFamily="49" charset="0"/>
+              </a:rPr>
+              <a:t>    private Boolean </a:t>
             </a:r>
             <a:r>
               <a:rPr lang="en-GB" sz="1200" dirty="0" err="1">
                 <a:latin typeface="Courier New" panose="02070309020205020404" pitchFamily="49" charset="0"/>
                 <a:cs typeface="Courier New" panose="02070309020205020404" pitchFamily="49" charset="0"/>
               </a:rPr>
-              <a:t>GeneratedValue</a:t>
-            </a:r>
-            <a:r>
-              <a:rPr lang="en-GB" sz="1200" dirty="0">
-                <a:latin typeface="Courier New" panose="02070309020205020404" pitchFamily="49" charset="0"/>
-                <a:cs typeface="Courier New" panose="02070309020205020404" pitchFamily="49" charset="0"/>
-              </a:rPr>
-              <a:t>(strategy = </a:t>
+              <a:t>is_blocked</a:t>
+            </a:r>
+            <a:r>
+              <a:rPr lang="en-GB" sz="1200" dirty="0">
+                <a:latin typeface="Courier New" panose="02070309020205020404" pitchFamily="49" charset="0"/>
+                <a:cs typeface="Courier New" panose="02070309020205020404" pitchFamily="49" charset="0"/>
+              </a:rPr>
+              <a:t>;</a:t>
+            </a:r>
+            <a:br>
+              <a:rPr lang="en-GB" sz="1200" dirty="0">
+                <a:latin typeface="Courier New" panose="02070309020205020404" pitchFamily="49" charset="0"/>
+                <a:cs typeface="Courier New" panose="02070309020205020404" pitchFamily="49" charset="0"/>
+              </a:rPr>
+            </a:br>
+            <a:r>
+              <a:rPr lang="en-GB" sz="1200" dirty="0">
+                <a:latin typeface="Courier New" panose="02070309020205020404" pitchFamily="49" charset="0"/>
+                <a:cs typeface="Courier New" panose="02070309020205020404" pitchFamily="49" charset="0"/>
+              </a:rPr>
+              <a:t>    private int points;</a:t>
+            </a:r>
+            <a:br>
+              <a:rPr lang="en-GB" sz="1200" dirty="0">
+                <a:latin typeface="Courier New" panose="02070309020205020404" pitchFamily="49" charset="0"/>
+                <a:cs typeface="Courier New" panose="02070309020205020404" pitchFamily="49" charset="0"/>
+              </a:rPr>
+            </a:br>
+            <a:r>
+              <a:rPr lang="en-GB" sz="1200" dirty="0">
+                <a:latin typeface="Courier New" panose="02070309020205020404" pitchFamily="49" charset="0"/>
+                <a:cs typeface="Courier New" panose="02070309020205020404" pitchFamily="49" charset="0"/>
+              </a:rPr>
+              <a:t>    private </a:t>
             </a:r>
             <a:r>
               <a:rPr lang="en-GB" sz="1200" dirty="0" err="1">
                 <a:latin typeface="Courier New" panose="02070309020205020404" pitchFamily="49" charset="0"/>
                 <a:cs typeface="Courier New" panose="02070309020205020404" pitchFamily="49" charset="0"/>
               </a:rPr>
-              <a:t>GenerationType.IDENTITY</a:t>
-            </a:r>
-            <a:r>
-              <a:rPr lang="en-GB" sz="1200" dirty="0">
-                <a:latin typeface="Courier New" panose="02070309020205020404" pitchFamily="49" charset="0"/>
-                <a:cs typeface="Courier New" panose="02070309020205020404" pitchFamily="49" charset="0"/>
-              </a:rPr>
-              <a:t>)</a:t>
-            </a:r>
-            <a:br>
-              <a:rPr lang="en-GB" sz="1200" dirty="0">
-                <a:latin typeface="Courier New" panose="02070309020205020404" pitchFamily="49" charset="0"/>
-                <a:cs typeface="Courier New" panose="02070309020205020404" pitchFamily="49" charset="0"/>
-              </a:rPr>
-            </a:br>
-            <a:r>
-              <a:rPr lang="en-GB" sz="1200" dirty="0">
-                <a:latin typeface="Courier New" panose="02070309020205020404" pitchFamily="49" charset="0"/>
-                <a:cs typeface="Courier New" panose="02070309020205020404" pitchFamily="49" charset="0"/>
-              </a:rPr>
-              <a:t>    private int id;</a:t>
-            </a:r>
-            <a:br>
-              <a:rPr lang="en-GB" sz="1200" dirty="0">
-                <a:latin typeface="Courier New" panose="02070309020205020404" pitchFamily="49" charset="0"/>
-                <a:cs typeface="Courier New" panose="02070309020205020404" pitchFamily="49" charset="0"/>
-              </a:rPr>
-            </a:br>
-            <a:r>
-              <a:rPr lang="en-GB" sz="1200" dirty="0">
-                <a:latin typeface="Courier New" panose="02070309020205020404" pitchFamily="49" charset="0"/>
-                <a:cs typeface="Courier New" panose="02070309020205020404" pitchFamily="49" charset="0"/>
-              </a:rPr>
-              <a:t>    @Column(unique = true)</a:t>
-            </a:r>
-            <a:br>
-              <a:rPr lang="en-GB" sz="1200" dirty="0">
-                <a:latin typeface="Courier New" panose="02070309020205020404" pitchFamily="49" charset="0"/>
-                <a:cs typeface="Courier New" panose="02070309020205020404" pitchFamily="49" charset="0"/>
-              </a:rPr>
-            </a:br>
-            <a:r>
-              <a:rPr lang="en-GB" sz="1200" dirty="0">
-                <a:latin typeface="Courier New" panose="02070309020205020404" pitchFamily="49" charset="0"/>
-                <a:cs typeface="Courier New" panose="02070309020205020404" pitchFamily="49" charset="0"/>
-              </a:rPr>
-              <a:t>    private String username;</a:t>
-            </a:r>
-            <a:br>
-              <a:rPr lang="en-GB" sz="1200" dirty="0">
-                <a:latin typeface="Courier New" panose="02070309020205020404" pitchFamily="49" charset="0"/>
-                <a:cs typeface="Courier New" panose="02070309020205020404" pitchFamily="49" charset="0"/>
-              </a:rPr>
-            </a:br>
-            <a:r>
-              <a:rPr lang="en-GB" sz="1200" dirty="0">
-                <a:latin typeface="Courier New" panose="02070309020205020404" pitchFamily="49" charset="0"/>
-                <a:cs typeface="Courier New" panose="02070309020205020404" pitchFamily="49" charset="0"/>
-              </a:rPr>
-              <a:t>    @Column(unique = true)</a:t>
-            </a:r>
-            <a:br>
-              <a:rPr lang="en-GB" sz="1200" dirty="0">
-                <a:latin typeface="Courier New" panose="02070309020205020404" pitchFamily="49" charset="0"/>
-                <a:cs typeface="Courier New" panose="02070309020205020404" pitchFamily="49" charset="0"/>
-              </a:rPr>
-            </a:br>
-            <a:r>
-              <a:rPr lang="en-GB" sz="1200" dirty="0">
-                <a:latin typeface="Courier New" panose="02070309020205020404" pitchFamily="49" charset="0"/>
-                <a:cs typeface="Courier New" panose="02070309020205020404" pitchFamily="49" charset="0"/>
-              </a:rPr>
-              <a:t>    private String email;</a:t>
-            </a:r>
-            <a:br>
-              <a:rPr lang="en-GB" sz="1200" dirty="0">
-                <a:latin typeface="Courier New" panose="02070309020205020404" pitchFamily="49" charset="0"/>
-                <a:cs typeface="Courier New" panose="02070309020205020404" pitchFamily="49" charset="0"/>
-              </a:rPr>
-            </a:br>
-            <a:br>
-              <a:rPr lang="en-GB" sz="1200" dirty="0">
-                <a:latin typeface="Courier New" panose="02070309020205020404" pitchFamily="49" charset="0"/>
-                <a:cs typeface="Courier New" panose="02070309020205020404" pitchFamily="49" charset="0"/>
-              </a:rPr>
-            </a:br>
-            <a:r>
-              <a:rPr lang="en-GB" sz="1200" dirty="0">
-                <a:latin typeface="Courier New" panose="02070309020205020404" pitchFamily="49" charset="0"/>
-                <a:cs typeface="Courier New" panose="02070309020205020404" pitchFamily="49" charset="0"/>
-              </a:rPr>
-              <a:t>    @</a:t>
+              <a:t>LocalDateTime</a:t>
+            </a:r>
+            <a:r>
+              <a:rPr lang="en-GB" sz="1200" dirty="0">
+                <a:latin typeface="Courier New" panose="02070309020205020404" pitchFamily="49" charset="0"/>
+                <a:cs typeface="Courier New" panose="02070309020205020404" pitchFamily="49" charset="0"/>
+              </a:rPr>
+              <a:t> </a:t>
             </a:r>
             <a:r>
               <a:rPr lang="en-GB" sz="1200" dirty="0" err="1">
                 <a:latin typeface="Courier New" panose="02070309020205020404" pitchFamily="49" charset="0"/>
                 <a:cs typeface="Courier New" panose="02070309020205020404" pitchFamily="49" charset="0"/>
               </a:rPr>
-              <a:t>OneToMany</a:t>
-            </a:r>
-            <a:br>
-              <a:rPr lang="en-GB" sz="1200" dirty="0">
-                <a:latin typeface="Courier New" panose="02070309020205020404" pitchFamily="49" charset="0"/>
-                <a:cs typeface="Courier New" panose="02070309020205020404" pitchFamily="49" charset="0"/>
-              </a:rPr>
-            </a:br>
-            <a:r>
-              <a:rPr lang="en-GB" sz="1200" dirty="0">
-                <a:latin typeface="Courier New" panose="02070309020205020404" pitchFamily="49" charset="0"/>
-                <a:cs typeface="Courier New" panose="02070309020205020404" pitchFamily="49" charset="0"/>
-              </a:rPr>
-              <a:t>    private List&lt;</a:t>
+              <a:t>last_login</a:t>
+            </a:r>
+            <a:r>
+              <a:rPr lang="en-GB" sz="1200" dirty="0">
+                <a:latin typeface="Courier New" panose="02070309020205020404" pitchFamily="49" charset="0"/>
+                <a:cs typeface="Courier New" panose="02070309020205020404" pitchFamily="49" charset="0"/>
+              </a:rPr>
+              <a:t>;</a:t>
+            </a:r>
+            <a:br>
+              <a:rPr lang="en-GB" sz="1200" dirty="0">
+                <a:latin typeface="Courier New" panose="02070309020205020404" pitchFamily="49" charset="0"/>
+                <a:cs typeface="Courier New" panose="02070309020205020404" pitchFamily="49" charset="0"/>
+              </a:rPr>
+            </a:br>
+            <a:br>
+              <a:rPr lang="en-GB" sz="1200" dirty="0">
+                <a:latin typeface="Courier New" panose="02070309020205020404" pitchFamily="49" charset="0"/>
+                <a:cs typeface="Courier New" panose="02070309020205020404" pitchFamily="49" charset="0"/>
+              </a:rPr>
+            </a:br>
+            <a:r>
+              <a:rPr lang="en-GB" sz="1200" dirty="0">
+                <a:latin typeface="Courier New" panose="02070309020205020404" pitchFamily="49" charset="0"/>
+                <a:cs typeface="Courier New" panose="02070309020205020404" pitchFamily="49" charset="0"/>
+              </a:rPr>
+              <a:t>    @OneToMany(fetch = </a:t>
             </a:r>
             <a:r>
               <a:rPr lang="en-GB" sz="1200" dirty="0" err="1">
                 <a:latin typeface="Courier New" panose="02070309020205020404" pitchFamily="49" charset="0"/>
                 <a:cs typeface="Courier New" panose="02070309020205020404" pitchFamily="49" charset="0"/>
               </a:rPr>
-              <a:t>UserAnswer</a:t>
-            </a:r>
-            <a:r>
-              <a:rPr lang="en-GB" sz="1200" dirty="0">
-                <a:latin typeface="Courier New" panose="02070309020205020404" pitchFamily="49" charset="0"/>
-                <a:cs typeface="Courier New" panose="02070309020205020404" pitchFamily="49" charset="0"/>
-              </a:rPr>
-              <a:t>&gt; answers;</a:t>
-            </a:r>
-            <a:br>
-              <a:rPr lang="en-GB" sz="1200" dirty="0">
-                <a:latin typeface="Courier New" panose="02070309020205020404" pitchFamily="49" charset="0"/>
-                <a:cs typeface="Courier New" panose="02070309020205020404" pitchFamily="49" charset="0"/>
-              </a:rPr>
-            </a:br>
-            <a:br>
-              <a:rPr lang="en-GB" sz="1200" dirty="0">
-                <a:latin typeface="Courier New" panose="02070309020205020404" pitchFamily="49" charset="0"/>
-                <a:cs typeface="Courier New" panose="02070309020205020404" pitchFamily="49" charset="0"/>
-              </a:rPr>
-            </a:br>
-            <a:r>
-              <a:rPr lang="en-GB" sz="1200" dirty="0">
-                <a:latin typeface="Courier New" panose="02070309020205020404" pitchFamily="49" charset="0"/>
-                <a:cs typeface="Courier New" panose="02070309020205020404" pitchFamily="49" charset="0"/>
-              </a:rPr>
-              <a:t>    private String password;</a:t>
-            </a:r>
-            <a:br>
-              <a:rPr lang="en-GB" sz="1200" dirty="0">
-                <a:latin typeface="Courier New" panose="02070309020205020404" pitchFamily="49" charset="0"/>
-                <a:cs typeface="Courier New" panose="02070309020205020404" pitchFamily="49" charset="0"/>
-              </a:rPr>
-            </a:br>
-            <a:r>
-              <a:rPr lang="en-GB" sz="1200" dirty="0">
-                <a:latin typeface="Courier New" panose="02070309020205020404" pitchFamily="49" charset="0"/>
-                <a:cs typeface="Courier New" panose="02070309020205020404" pitchFamily="49" charset="0"/>
-              </a:rPr>
-              <a:t>    private String name;</a:t>
-            </a:r>
-            <a:br>
-              <a:rPr lang="en-GB" sz="1200" dirty="0">
-                <a:latin typeface="Courier New" panose="02070309020205020404" pitchFamily="49" charset="0"/>
-                <a:cs typeface="Courier New" panose="02070309020205020404" pitchFamily="49" charset="0"/>
-              </a:rPr>
-            </a:br>
-            <a:r>
-              <a:rPr lang="en-GB" sz="1200" dirty="0">
-                <a:latin typeface="Courier New" panose="02070309020205020404" pitchFamily="49" charset="0"/>
-                <a:cs typeface="Courier New" panose="02070309020205020404" pitchFamily="49" charset="0"/>
-              </a:rPr>
-              <a:t>    private String surname;</a:t>
-            </a:r>
-            <a:br>
-              <a:rPr lang="en-GB" sz="1200" dirty="0">
-                <a:latin typeface="Courier New" panose="02070309020205020404" pitchFamily="49" charset="0"/>
-                <a:cs typeface="Courier New" panose="02070309020205020404" pitchFamily="49" charset="0"/>
-              </a:rPr>
-            </a:br>
-            <a:r>
-              <a:rPr lang="en-GB" sz="1200" dirty="0">
-                <a:latin typeface="Courier New" panose="02070309020205020404" pitchFamily="49" charset="0"/>
-                <a:cs typeface="Courier New" panose="02070309020205020404" pitchFamily="49" charset="0"/>
-              </a:rPr>
-              <a:t>    private Boolean </a:t>
-            </a:r>
-            <a:r>
-              <a:rPr lang="en-GB" sz="1200" dirty="0" err="1">
-                <a:latin typeface="Courier New" panose="02070309020205020404" pitchFamily="49" charset="0"/>
-                <a:cs typeface="Courier New" panose="02070309020205020404" pitchFamily="49" charset="0"/>
-              </a:rPr>
-              <a:t>is_blocked</a:t>
-            </a:r>
-            <a:r>
-              <a:rPr lang="en-GB" sz="1200" dirty="0">
-                <a:latin typeface="Courier New" panose="02070309020205020404" pitchFamily="49" charset="0"/>
-                <a:cs typeface="Courier New" panose="02070309020205020404" pitchFamily="49" charset="0"/>
-              </a:rPr>
-              <a:t>;</a:t>
-            </a:r>
-            <a:br>
-              <a:rPr lang="en-GB" sz="1200" dirty="0">
-                <a:latin typeface="Courier New" panose="02070309020205020404" pitchFamily="49" charset="0"/>
-                <a:cs typeface="Courier New" panose="02070309020205020404" pitchFamily="49" charset="0"/>
-              </a:rPr>
-            </a:br>
-            <a:r>
-              <a:rPr lang="en-GB" sz="1200" dirty="0">
-                <a:latin typeface="Courier New" panose="02070309020205020404" pitchFamily="49" charset="0"/>
-                <a:cs typeface="Courier New" panose="02070309020205020404" pitchFamily="49" charset="0"/>
-              </a:rPr>
-              <a:t>    private int points;</a:t>
-            </a:r>
-            <a:br>
-              <a:rPr lang="en-GB" sz="1200" dirty="0">
-                <a:latin typeface="Courier New" panose="02070309020205020404" pitchFamily="49" charset="0"/>
-                <a:cs typeface="Courier New" panose="02070309020205020404" pitchFamily="49" charset="0"/>
-              </a:rPr>
-            </a:br>
-            <a:r>
-              <a:rPr lang="en-GB" sz="1200" dirty="0">
-                <a:latin typeface="Courier New" panose="02070309020205020404" pitchFamily="49" charset="0"/>
-                <a:cs typeface="Courier New" panose="02070309020205020404" pitchFamily="49" charset="0"/>
-              </a:rPr>
-              <a:t>    private </a:t>
-            </a:r>
-            <a:r>
-              <a:rPr lang="en-GB" sz="1200" dirty="0" err="1">
-                <a:latin typeface="Courier New" panose="02070309020205020404" pitchFamily="49" charset="0"/>
-                <a:cs typeface="Courier New" panose="02070309020205020404" pitchFamily="49" charset="0"/>
-              </a:rPr>
-              <a:t>LocalDateTime</a:t>
-            </a:r>
-            <a:r>
-              <a:rPr lang="en-GB" sz="1200" dirty="0">
-                <a:latin typeface="Courier New" panose="02070309020205020404" pitchFamily="49" charset="0"/>
-                <a:cs typeface="Courier New" panose="02070309020205020404" pitchFamily="49" charset="0"/>
-              </a:rPr>
-              <a:t> </a:t>
-            </a:r>
-            <a:r>
-              <a:rPr lang="en-GB" sz="1200" dirty="0" err="1">
-                <a:latin typeface="Courier New" panose="02070309020205020404" pitchFamily="49" charset="0"/>
-                <a:cs typeface="Courier New" panose="02070309020205020404" pitchFamily="49" charset="0"/>
-              </a:rPr>
-              <a:t>last_login</a:t>
-            </a:r>
-            <a:r>
-              <a:rPr lang="en-GB" sz="1200" dirty="0">
-                <a:latin typeface="Courier New" panose="02070309020205020404" pitchFamily="49" charset="0"/>
-                <a:cs typeface="Courier New" panose="02070309020205020404" pitchFamily="49" charset="0"/>
-              </a:rPr>
-              <a:t>;</a:t>
-            </a:r>
-            <a:br>
-              <a:rPr lang="en-GB" sz="1200" dirty="0">
-                <a:latin typeface="Courier New" panose="02070309020205020404" pitchFamily="49" charset="0"/>
-                <a:cs typeface="Courier New" panose="02070309020205020404" pitchFamily="49" charset="0"/>
-              </a:rPr>
-            </a:br>
-            <a:br>
-              <a:rPr lang="en-GB" sz="1200" dirty="0">
-                <a:latin typeface="Courier New" panose="02070309020205020404" pitchFamily="49" charset="0"/>
-                <a:cs typeface="Courier New" panose="02070309020205020404" pitchFamily="49" charset="0"/>
-              </a:rPr>
-            </a:br>
-            <a:r>
-              <a:rPr lang="en-GB" sz="1200" dirty="0">
-                <a:latin typeface="Courier New" panose="02070309020205020404" pitchFamily="49" charset="0"/>
-                <a:cs typeface="Courier New" panose="02070309020205020404" pitchFamily="49" charset="0"/>
-              </a:rPr>
-              <a:t>    @</a:t>
-            </a:r>
-            <a:r>
-              <a:rPr lang="en-GB" sz="1200" dirty="0" err="1">
-                <a:latin typeface="Courier New" panose="02070309020205020404" pitchFamily="49" charset="0"/>
-                <a:cs typeface="Courier New" panose="02070309020205020404" pitchFamily="49" charset="0"/>
-              </a:rPr>
-              <a:t>OneToMany</a:t>
-            </a:r>
-            <a:r>
-              <a:rPr lang="en-GB" sz="1200" dirty="0">
-                <a:latin typeface="Courier New" panose="02070309020205020404" pitchFamily="49" charset="0"/>
-                <a:cs typeface="Courier New" panose="02070309020205020404" pitchFamily="49" charset="0"/>
-              </a:rPr>
-              <a:t>(fetch = </a:t>
-            </a:r>
-            <a:r>
-              <a:rPr lang="en-GB" sz="1200" dirty="0" err="1">
-                <a:latin typeface="Courier New" panose="02070309020205020404" pitchFamily="49" charset="0"/>
-                <a:cs typeface="Courier New" panose="02070309020205020404" pitchFamily="49" charset="0"/>
-              </a:rPr>
-              <a:t>FetchType.EAGER</a:t>
+              <a:t>FetchType.Lazy</a:t>
             </a:r>
             <a:r>
               <a:rPr lang="en-GB" sz="1200" dirty="0">
@@ -8929,35 +8560,48 @@
                 <a:latin typeface="Courier New" panose="02070309020205020404" pitchFamily="49" charset="0"/>
                 <a:cs typeface="Courier New" panose="02070309020205020404" pitchFamily="49" charset="0"/>
               </a:rPr>
-              <a:t>@</a:t>
+              <a:t>@NamedQuery(name="UserAnswer.findByQuestionnaire", query = "SELECT a FROM </a:t>
             </a:r>
             <a:r>
               <a:rPr lang="en-GB" sz="1200" dirty="0" err="1">
                 <a:latin typeface="Courier New" panose="02070309020205020404" pitchFamily="49" charset="0"/>
                 <a:cs typeface="Courier New" panose="02070309020205020404" pitchFamily="49" charset="0"/>
               </a:rPr>
-              <a:t>NamedQuery</a:t>
-            </a:r>
-            <a:r>
-              <a:rPr lang="en-GB" sz="1200" dirty="0">
-                <a:latin typeface="Courier New" panose="02070309020205020404" pitchFamily="49" charset="0"/>
-                <a:cs typeface="Courier New" panose="02070309020205020404" pitchFamily="49" charset="0"/>
-              </a:rPr>
-              <a:t>(name="</a:t>
+              <a:t>UserAnswer</a:t>
+            </a:r>
+            <a:r>
+              <a:rPr lang="en-GB" sz="1200" dirty="0">
+                <a:latin typeface="Courier New" panose="02070309020205020404" pitchFamily="49" charset="0"/>
+                <a:cs typeface="Courier New" panose="02070309020205020404" pitchFamily="49" charset="0"/>
+              </a:rPr>
+              <a:t> a WHERE </a:t>
             </a:r>
             <a:r>
               <a:rPr lang="en-GB" sz="1200" dirty="0" err="1">
                 <a:latin typeface="Courier New" panose="02070309020205020404" pitchFamily="49" charset="0"/>
                 <a:cs typeface="Courier New" panose="02070309020205020404" pitchFamily="49" charset="0"/>
               </a:rPr>
-              <a:t>UserAnswer.findByQuestionnaire</a:t>
-            </a:r>
-            <a:r>
-              <a:rPr lang="en-GB" sz="1200" dirty="0">
-                <a:latin typeface="Courier New" panose="02070309020205020404" pitchFamily="49" charset="0"/>
-                <a:cs typeface="Courier New" panose="02070309020205020404" pitchFamily="49" charset="0"/>
-              </a:rPr>
-              <a:t>", query = "SELECT a FROM </a:t>
+              <a:t>a.relatedQuestionnaire</a:t>
+            </a:r>
+            <a:r>
+              <a:rPr lang="en-GB" sz="1200" dirty="0">
+                <a:latin typeface="Courier New" panose="02070309020205020404" pitchFamily="49" charset="0"/>
+                <a:cs typeface="Courier New" panose="02070309020205020404" pitchFamily="49" charset="0"/>
+              </a:rPr>
+              <a:t> = ?1")</a:t>
+            </a:r>
+            <a:br>
+              <a:rPr lang="en-GB" sz="1200" dirty="0">
+                <a:latin typeface="Courier New" panose="02070309020205020404" pitchFamily="49" charset="0"/>
+                <a:cs typeface="Courier New" panose="02070309020205020404" pitchFamily="49" charset="0"/>
+              </a:rPr>
+            </a:br>
+            <a:r>
+              <a:rPr lang="en-GB" sz="1200" dirty="0">
+                <a:latin typeface="Courier New" panose="02070309020205020404" pitchFamily="49" charset="0"/>
+                <a:cs typeface="Courier New" panose="02070309020205020404" pitchFamily="49" charset="0"/>
+              </a:rPr>
+              <a:t>public class </a:t>
             </a:r>
             <a:r>
               <a:rPr lang="en-GB" sz="1200" dirty="0" err="1">
@@ -8971,147 +8615,270 @@
                 <a:latin typeface="Courier New" panose="02070309020205020404" pitchFamily="49" charset="0"/>
                 <a:cs typeface="Courier New" panose="02070309020205020404" pitchFamily="49" charset="0"/>
               </a:rPr>
-              <a:t> a WHERE </a:t>
+              <a:t> {</a:t>
+            </a:r>
+            <a:br>
+              <a:rPr lang="en-GB" sz="1200" dirty="0">
+                <a:latin typeface="Courier New" panose="02070309020205020404" pitchFamily="49" charset="0"/>
+                <a:cs typeface="Courier New" panose="02070309020205020404" pitchFamily="49" charset="0"/>
+              </a:rPr>
+            </a:br>
+            <a:br>
+              <a:rPr lang="en-GB" sz="1200" dirty="0">
+                <a:latin typeface="Courier New" panose="02070309020205020404" pitchFamily="49" charset="0"/>
+                <a:cs typeface="Courier New" panose="02070309020205020404" pitchFamily="49" charset="0"/>
+              </a:rPr>
+            </a:br>
+            <a:r>
+              <a:rPr lang="en-GB" sz="1200" dirty="0">
+                <a:latin typeface="Courier New" panose="02070309020205020404" pitchFamily="49" charset="0"/>
+                <a:cs typeface="Courier New" panose="02070309020205020404" pitchFamily="49" charset="0"/>
+              </a:rPr>
+              <a:t>    @Id</a:t>
+            </a:r>
+            <a:br>
+              <a:rPr lang="en-GB" sz="1200" dirty="0">
+                <a:latin typeface="Courier New" panose="02070309020205020404" pitchFamily="49" charset="0"/>
+                <a:cs typeface="Courier New" panose="02070309020205020404" pitchFamily="49" charset="0"/>
+              </a:rPr>
+            </a:br>
+            <a:r>
+              <a:rPr lang="en-GB" sz="1200" dirty="0">
+                <a:latin typeface="Courier New" panose="02070309020205020404" pitchFamily="49" charset="0"/>
+                <a:cs typeface="Courier New" panose="02070309020205020404" pitchFamily="49" charset="0"/>
+              </a:rPr>
+              <a:t>    @GeneratedValue(strategy = </a:t>
             </a:r>
             <a:r>
               <a:rPr lang="en-GB" sz="1200" dirty="0" err="1">
                 <a:latin typeface="Courier New" panose="02070309020205020404" pitchFamily="49" charset="0"/>
                 <a:cs typeface="Courier New" panose="02070309020205020404" pitchFamily="49" charset="0"/>
               </a:rPr>
-              <a:t>a.relatedQuestionnaire</a:t>
-            </a:r>
-            <a:r>
-              <a:rPr lang="en-GB" sz="1200" dirty="0">
-                <a:latin typeface="Courier New" panose="02070309020205020404" pitchFamily="49" charset="0"/>
-                <a:cs typeface="Courier New" panose="02070309020205020404" pitchFamily="49" charset="0"/>
-              </a:rPr>
-              <a:t> = ?1")</a:t>
-            </a:r>
-            <a:br>
-              <a:rPr lang="en-GB" sz="1200" dirty="0">
-                <a:latin typeface="Courier New" panose="02070309020205020404" pitchFamily="49" charset="0"/>
-                <a:cs typeface="Courier New" panose="02070309020205020404" pitchFamily="49" charset="0"/>
-              </a:rPr>
-            </a:br>
-            <a:r>
-              <a:rPr lang="en-GB" sz="1200" dirty="0">
-                <a:latin typeface="Courier New" panose="02070309020205020404" pitchFamily="49" charset="0"/>
-                <a:cs typeface="Courier New" panose="02070309020205020404" pitchFamily="49" charset="0"/>
-              </a:rPr>
-              <a:t>public class </a:t>
+              <a:t>GenerationType.AUTO</a:t>
+            </a:r>
+            <a:r>
+              <a:rPr lang="en-GB" sz="1200" dirty="0">
+                <a:latin typeface="Courier New" panose="02070309020205020404" pitchFamily="49" charset="0"/>
+                <a:cs typeface="Courier New" panose="02070309020205020404" pitchFamily="49" charset="0"/>
+              </a:rPr>
+              <a:t>)</a:t>
+            </a:r>
+            <a:br>
+              <a:rPr lang="en-GB" sz="1200" dirty="0">
+                <a:latin typeface="Courier New" panose="02070309020205020404" pitchFamily="49" charset="0"/>
+                <a:cs typeface="Courier New" panose="02070309020205020404" pitchFamily="49" charset="0"/>
+              </a:rPr>
+            </a:br>
+            <a:r>
+              <a:rPr lang="en-GB" sz="1200" dirty="0">
+                <a:latin typeface="Courier New" panose="02070309020205020404" pitchFamily="49" charset="0"/>
+                <a:cs typeface="Courier New" panose="02070309020205020404" pitchFamily="49" charset="0"/>
+              </a:rPr>
+              <a:t>    private long id;</a:t>
+            </a:r>
+            <a:br>
+              <a:rPr lang="en-GB" sz="1200" dirty="0">
+                <a:latin typeface="Courier New" panose="02070309020205020404" pitchFamily="49" charset="0"/>
+                <a:cs typeface="Courier New" panose="02070309020205020404" pitchFamily="49" charset="0"/>
+              </a:rPr>
+            </a:br>
+            <a:br>
+              <a:rPr lang="en-GB" sz="1200" dirty="0">
+                <a:latin typeface="Courier New" panose="02070309020205020404" pitchFamily="49" charset="0"/>
+                <a:cs typeface="Courier New" panose="02070309020205020404" pitchFamily="49" charset="0"/>
+              </a:rPr>
+            </a:br>
+            <a:r>
+              <a:rPr lang="en-GB" sz="1200" dirty="0">
+                <a:latin typeface="Courier New" panose="02070309020205020404" pitchFamily="49" charset="0"/>
+                <a:cs typeface="Courier New" panose="02070309020205020404" pitchFamily="49" charset="0"/>
+              </a:rPr>
+              <a:t>    private int </a:t>
             </a:r>
             <a:r>
               <a:rPr lang="en-GB" sz="1200" dirty="0" err="1">
                 <a:latin typeface="Courier New" panose="02070309020205020404" pitchFamily="49" charset="0"/>
                 <a:cs typeface="Courier New" panose="02070309020205020404" pitchFamily="49" charset="0"/>
               </a:rPr>
-              <a:t>UserAnswer</a:t>
-            </a:r>
-            <a:r>
-              <a:rPr lang="en-GB" sz="1200" dirty="0">
-                <a:latin typeface="Courier New" panose="02070309020205020404" pitchFamily="49" charset="0"/>
-                <a:cs typeface="Courier New" panose="02070309020205020404" pitchFamily="49" charset="0"/>
-              </a:rPr>
-              <a:t> {</a:t>
-            </a:r>
-            <a:br>
-              <a:rPr lang="en-GB" sz="1200" dirty="0">
-                <a:latin typeface="Courier New" panose="02070309020205020404" pitchFamily="49" charset="0"/>
-                <a:cs typeface="Courier New" panose="02070309020205020404" pitchFamily="49" charset="0"/>
-              </a:rPr>
-            </a:br>
-            <a:br>
-              <a:rPr lang="en-GB" sz="1200" dirty="0">
-                <a:latin typeface="Courier New" panose="02070309020205020404" pitchFamily="49" charset="0"/>
-                <a:cs typeface="Courier New" panose="02070309020205020404" pitchFamily="49" charset="0"/>
-              </a:rPr>
-            </a:br>
-            <a:r>
-              <a:rPr lang="en-GB" sz="1200" dirty="0">
-                <a:latin typeface="Courier New" panose="02070309020205020404" pitchFamily="49" charset="0"/>
-                <a:cs typeface="Courier New" panose="02070309020205020404" pitchFamily="49" charset="0"/>
-              </a:rPr>
-              <a:t>    @Id</a:t>
-            </a:r>
-            <a:br>
-              <a:rPr lang="en-GB" sz="1200" dirty="0">
-                <a:latin typeface="Courier New" panose="02070309020205020404" pitchFamily="49" charset="0"/>
-                <a:cs typeface="Courier New" panose="02070309020205020404" pitchFamily="49" charset="0"/>
-              </a:rPr>
-            </a:br>
-            <a:r>
-              <a:rPr lang="en-GB" sz="1200" dirty="0">
-                <a:latin typeface="Courier New" panose="02070309020205020404" pitchFamily="49" charset="0"/>
-                <a:cs typeface="Courier New" panose="02070309020205020404" pitchFamily="49" charset="0"/>
-              </a:rPr>
-              <a:t>    @</a:t>
+              <a:t>pointsEarned</a:t>
+            </a:r>
+            <a:r>
+              <a:rPr lang="en-GB" sz="1200" dirty="0">
+                <a:latin typeface="Courier New" panose="02070309020205020404" pitchFamily="49" charset="0"/>
+                <a:cs typeface="Courier New" panose="02070309020205020404" pitchFamily="49" charset="0"/>
+              </a:rPr>
+              <a:t>;</a:t>
+            </a:r>
+            <a:br>
+              <a:rPr lang="en-GB" sz="1200" dirty="0">
+                <a:latin typeface="Courier New" panose="02070309020205020404" pitchFamily="49" charset="0"/>
+                <a:cs typeface="Courier New" panose="02070309020205020404" pitchFamily="49" charset="0"/>
+              </a:rPr>
+            </a:br>
+            <a:br>
+              <a:rPr lang="en-GB" sz="1200" dirty="0">
+                <a:latin typeface="Courier New" panose="02070309020205020404" pitchFamily="49" charset="0"/>
+                <a:cs typeface="Courier New" panose="02070309020205020404" pitchFamily="49" charset="0"/>
+              </a:rPr>
+            </a:br>
+            <a:r>
+              <a:rPr lang="en-GB" sz="1200" dirty="0">
+                <a:latin typeface="Courier New" panose="02070309020205020404" pitchFamily="49" charset="0"/>
+                <a:cs typeface="Courier New" panose="02070309020205020404" pitchFamily="49" charset="0"/>
+              </a:rPr>
+              <a:t>    @ElementCollection</a:t>
+            </a:r>
+            <a:br>
+              <a:rPr lang="en-GB" sz="1200" dirty="0">
+                <a:latin typeface="Courier New" panose="02070309020205020404" pitchFamily="49" charset="0"/>
+                <a:cs typeface="Courier New" panose="02070309020205020404" pitchFamily="49" charset="0"/>
+              </a:rPr>
+            </a:br>
+            <a:r>
+              <a:rPr lang="en-GB" sz="1200" dirty="0">
+                <a:latin typeface="Courier New" panose="02070309020205020404" pitchFamily="49" charset="0"/>
+                <a:cs typeface="Courier New" panose="02070309020205020404" pitchFamily="49" charset="0"/>
+              </a:rPr>
+              <a:t>    private Map&lt;Question, String&gt; answers;</a:t>
+            </a:r>
+            <a:br>
+              <a:rPr lang="en-GB" sz="1200" dirty="0">
+                <a:latin typeface="Courier New" panose="02070309020205020404" pitchFamily="49" charset="0"/>
+                <a:cs typeface="Courier New" panose="02070309020205020404" pitchFamily="49" charset="0"/>
+              </a:rPr>
+            </a:br>
+            <a:br>
+              <a:rPr lang="en-GB" sz="1200" dirty="0">
+                <a:latin typeface="Courier New" panose="02070309020205020404" pitchFamily="49" charset="0"/>
+                <a:cs typeface="Courier New" panose="02070309020205020404" pitchFamily="49" charset="0"/>
+              </a:rPr>
+            </a:br>
+            <a:r>
+              <a:rPr lang="en-GB" sz="1200" dirty="0">
+                <a:latin typeface="Courier New" panose="02070309020205020404" pitchFamily="49" charset="0"/>
+                <a:cs typeface="Courier New" panose="02070309020205020404" pitchFamily="49" charset="0"/>
+              </a:rPr>
+              <a:t>    @ManyToOne(cascade = {</a:t>
             </a:r>
             <a:r>
               <a:rPr lang="en-GB" sz="1200" dirty="0" err="1">
                 <a:latin typeface="Courier New" panose="02070309020205020404" pitchFamily="49" charset="0"/>
                 <a:cs typeface="Courier New" panose="02070309020205020404" pitchFamily="49" charset="0"/>
               </a:rPr>
-              <a:t>GeneratedValue</a:t>
-            </a:r>
-            <a:r>
-              <a:rPr lang="en-GB" sz="1200" dirty="0">
-                <a:latin typeface="Courier New" panose="02070309020205020404" pitchFamily="49" charset="0"/>
-                <a:cs typeface="Courier New" panose="02070309020205020404" pitchFamily="49" charset="0"/>
-              </a:rPr>
-              <a:t>(strategy = </a:t>
+              <a:t>CascadeType.REFRESH</a:t>
+            </a:r>
+            <a:r>
+              <a:rPr lang="en-GB" sz="1200" dirty="0">
+                <a:latin typeface="Courier New" panose="02070309020205020404" pitchFamily="49" charset="0"/>
+                <a:cs typeface="Courier New" panose="02070309020205020404" pitchFamily="49" charset="0"/>
+              </a:rPr>
+              <a:t>})</a:t>
+            </a:r>
+          </a:p>
+          <a:p>
+            <a:pPr marL="0" indent="0">
+              <a:spcBef>
+                <a:spcPts val="0"/>
+              </a:spcBef>
+              <a:buNone/>
+            </a:pPr>
+            <a:r>
+              <a:rPr lang="en-GB" sz="1200" dirty="0">
+                <a:latin typeface="Courier New" panose="02070309020205020404" pitchFamily="49" charset="0"/>
+                <a:cs typeface="Courier New" panose="02070309020205020404" pitchFamily="49" charset="0"/>
+              </a:rPr>
+              <a:t>    private Questionnaire </a:t>
             </a:r>
             <a:r>
               <a:rPr lang="en-GB" sz="1200" dirty="0" err="1">
                 <a:latin typeface="Courier New" panose="02070309020205020404" pitchFamily="49" charset="0"/>
                 <a:cs typeface="Courier New" panose="02070309020205020404" pitchFamily="49" charset="0"/>
               </a:rPr>
-              <a:t>GenerationType.AUTO</a:t>
-            </a:r>
-            <a:r>
-              <a:rPr lang="en-GB" sz="1200" dirty="0">
-                <a:latin typeface="Courier New" panose="02070309020205020404" pitchFamily="49" charset="0"/>
-                <a:cs typeface="Courier New" panose="02070309020205020404" pitchFamily="49" charset="0"/>
-              </a:rPr>
-              <a:t>)</a:t>
-            </a:r>
-            <a:br>
-              <a:rPr lang="en-GB" sz="1200" dirty="0">
-                <a:latin typeface="Courier New" panose="02070309020205020404" pitchFamily="49" charset="0"/>
-                <a:cs typeface="Courier New" panose="02070309020205020404" pitchFamily="49" charset="0"/>
-              </a:rPr>
-            </a:br>
-            <a:r>
-              <a:rPr lang="en-GB" sz="1200" dirty="0">
-                <a:latin typeface="Courier New" panose="02070309020205020404" pitchFamily="49" charset="0"/>
-                <a:cs typeface="Courier New" panose="02070309020205020404" pitchFamily="49" charset="0"/>
-              </a:rPr>
-              <a:t>    private long id;</a:t>
-            </a:r>
-            <a:br>
-              <a:rPr lang="en-GB" sz="1200" dirty="0">
-                <a:latin typeface="Courier New" panose="02070309020205020404" pitchFamily="49" charset="0"/>
-                <a:cs typeface="Courier New" panose="02070309020205020404" pitchFamily="49" charset="0"/>
-              </a:rPr>
-            </a:br>
-            <a:br>
-              <a:rPr lang="en-GB" sz="1200" dirty="0">
-                <a:latin typeface="Courier New" panose="02070309020205020404" pitchFamily="49" charset="0"/>
-                <a:cs typeface="Courier New" panose="02070309020205020404" pitchFamily="49" charset="0"/>
-              </a:rPr>
-            </a:br>
-            <a:r>
-              <a:rPr lang="en-GB" sz="1200" dirty="0">
-                <a:latin typeface="Courier New" panose="02070309020205020404" pitchFamily="49" charset="0"/>
-                <a:cs typeface="Courier New" panose="02070309020205020404" pitchFamily="49" charset="0"/>
-              </a:rPr>
-              <a:t>    private int </a:t>
+              <a:t>relatedQuestionnaire</a:t>
+            </a:r>
+            <a:r>
+              <a:rPr lang="en-GB" sz="1200" dirty="0">
+                <a:latin typeface="Courier New" panose="02070309020205020404" pitchFamily="49" charset="0"/>
+                <a:cs typeface="Courier New" panose="02070309020205020404" pitchFamily="49" charset="0"/>
+              </a:rPr>
+              <a:t>;</a:t>
+            </a:r>
+          </a:p>
+          <a:p>
+            <a:pPr marL="0" indent="0">
+              <a:spcBef>
+                <a:spcPts val="0"/>
+              </a:spcBef>
+              <a:buNone/>
+            </a:pPr>
+            <a:endParaRPr lang="en-GB" sz="1200" dirty="0">
+              <a:latin typeface="Courier New" panose="02070309020205020404" pitchFamily="49" charset="0"/>
+              <a:cs typeface="Courier New" panose="02070309020205020404" pitchFamily="49" charset="0"/>
+            </a:endParaRPr>
+          </a:p>
+          <a:p>
+            <a:pPr marL="0" indent="0">
+              <a:spcBef>
+                <a:spcPts val="0"/>
+              </a:spcBef>
+              <a:buNone/>
+            </a:pPr>
+            <a:r>
+              <a:rPr lang="en-GB" sz="1200" dirty="0">
+                <a:latin typeface="Courier New" panose="02070309020205020404" pitchFamily="49" charset="0"/>
+                <a:cs typeface="Courier New" panose="02070309020205020404" pitchFamily="49" charset="0"/>
+              </a:rPr>
+              <a:t>    @ManyToOne(cascade = { </a:t>
             </a:r>
             <a:r>
               <a:rPr lang="en-GB" sz="1200" dirty="0" err="1">
                 <a:latin typeface="Courier New" panose="02070309020205020404" pitchFamily="49" charset="0"/>
                 <a:cs typeface="Courier New" panose="02070309020205020404" pitchFamily="49" charset="0"/>
               </a:rPr>
-              <a:t>pointsEarned</a:t>
+              <a:t>CascadeType.MERGE</a:t>
+            </a:r>
+            <a:r>
+              <a:rPr lang="en-GB" sz="1200" dirty="0">
+                <a:latin typeface="Courier New" panose="02070309020205020404" pitchFamily="49" charset="0"/>
+                <a:cs typeface="Courier New" panose="02070309020205020404" pitchFamily="49" charset="0"/>
+              </a:rPr>
+              <a:t>, </a:t>
+            </a:r>
+            <a:r>
+              <a:rPr lang="en-GB" sz="1200" dirty="0" err="1">
+                <a:latin typeface="Courier New" panose="02070309020205020404" pitchFamily="49" charset="0"/>
+                <a:cs typeface="Courier New" panose="02070309020205020404" pitchFamily="49" charset="0"/>
+              </a:rPr>
+              <a:t>CascadeType.REFRESH</a:t>
+            </a:r>
+            <a:r>
+              <a:rPr lang="en-GB" sz="1200" dirty="0">
+                <a:latin typeface="Courier New" panose="02070309020205020404" pitchFamily="49" charset="0"/>
+                <a:cs typeface="Courier New" panose="02070309020205020404" pitchFamily="49" charset="0"/>
+              </a:rPr>
+              <a:t>})</a:t>
+            </a:r>
+          </a:p>
+          <a:p>
+            <a:pPr marL="0" indent="0">
+              <a:spcBef>
+                <a:spcPts val="0"/>
+              </a:spcBef>
+              <a:buNone/>
+            </a:pPr>
+            <a:r>
+              <a:rPr lang="en-GB" sz="1200" dirty="0">
+                <a:latin typeface="Courier New" panose="02070309020205020404" pitchFamily="49" charset="0"/>
+                <a:cs typeface="Courier New" panose="02070309020205020404" pitchFamily="49" charset="0"/>
+              </a:rPr>
+              <a:t>    private User </a:t>
+            </a:r>
+            <a:r>
+              <a:rPr lang="en-GB" sz="1200" dirty="0" err="1">
+                <a:latin typeface="Courier New" panose="02070309020205020404" pitchFamily="49" charset="0"/>
+                <a:cs typeface="Courier New" panose="02070309020205020404" pitchFamily="49" charset="0"/>
+              </a:rPr>
+              <a:t>relatedUser</a:t>
             </a:r>
             <a:r>
               <a:rPr lang="en-GB" sz="1200" dirty="0">
@@ -9120,150 +8887,61 @@
               </a:rPr>
               <a:t>;</a:t>
             </a:r>
-            <a:br>
-              <a:rPr lang="en-GB" sz="1200" dirty="0">
-                <a:latin typeface="Courier New" panose="02070309020205020404" pitchFamily="49" charset="0"/>
-                <a:cs typeface="Courier New" panose="02070309020205020404" pitchFamily="49" charset="0"/>
-              </a:rPr>
-            </a:br>
-            <a:br>
-              <a:rPr lang="en-GB" sz="1200" dirty="0">
-                <a:latin typeface="Courier New" panose="02070309020205020404" pitchFamily="49" charset="0"/>
-                <a:cs typeface="Courier New" panose="02070309020205020404" pitchFamily="49" charset="0"/>
-              </a:rPr>
-            </a:br>
-            <a:r>
-              <a:rPr lang="en-GB" sz="1200" dirty="0">
-                <a:latin typeface="Courier New" panose="02070309020205020404" pitchFamily="49" charset="0"/>
-                <a:cs typeface="Courier New" panose="02070309020205020404" pitchFamily="49" charset="0"/>
-              </a:rPr>
-              <a:t>    @</a:t>
+          </a:p>
+          <a:p>
+            <a:pPr marL="0" indent="0">
+              <a:spcBef>
+                <a:spcPts val="0"/>
+              </a:spcBef>
+              <a:buNone/>
+            </a:pPr>
+            <a:endParaRPr lang="en-GB" sz="1200" dirty="0">
+              <a:latin typeface="Courier New" panose="02070309020205020404" pitchFamily="49" charset="0"/>
+              <a:cs typeface="Courier New" panose="02070309020205020404" pitchFamily="49" charset="0"/>
+            </a:endParaRPr>
+          </a:p>
+          <a:p>
+            <a:pPr marL="0" indent="0">
+              <a:spcBef>
+                <a:spcPts val="0"/>
+              </a:spcBef>
+              <a:buNone/>
+            </a:pPr>
+            <a:r>
+              <a:rPr lang="en-GB" sz="1200" dirty="0">
+                <a:latin typeface="Courier New" panose="02070309020205020404" pitchFamily="49" charset="0"/>
+                <a:cs typeface="Courier New" panose="02070309020205020404" pitchFamily="49" charset="0"/>
+              </a:rPr>
+              <a:t>    @Enumerated(EnumType.STRING)</a:t>
+            </a:r>
+          </a:p>
+          <a:p>
+            <a:pPr marL="0" indent="0">
+              <a:spcBef>
+                <a:spcPts val="0"/>
+              </a:spcBef>
+              <a:buNone/>
+            </a:pPr>
+            <a:r>
+              <a:rPr lang="en-GB" sz="1200" dirty="0">
+                <a:latin typeface="Courier New" panose="02070309020205020404" pitchFamily="49" charset="0"/>
+                <a:cs typeface="Courier New" panose="02070309020205020404" pitchFamily="49" charset="0"/>
+              </a:rPr>
+              <a:t>    private </a:t>
             </a:r>
             <a:r>
               <a:rPr lang="en-GB" sz="1200" dirty="0" err="1">
                 <a:latin typeface="Courier New" panose="02070309020205020404" pitchFamily="49" charset="0"/>
                 <a:cs typeface="Courier New" panose="02070309020205020404" pitchFamily="49" charset="0"/>
               </a:rPr>
-              <a:t>ElementCollection</a:t>
-            </a:r>
-            <a:br>
-              <a:rPr lang="en-GB" sz="1200" dirty="0">
-                <a:latin typeface="Courier New" panose="02070309020205020404" pitchFamily="49" charset="0"/>
-                <a:cs typeface="Courier New" panose="02070309020205020404" pitchFamily="49" charset="0"/>
-              </a:rPr>
-            </a:br>
-            <a:r>
-              <a:rPr lang="en-GB" sz="1200" dirty="0">
-                <a:latin typeface="Courier New" panose="02070309020205020404" pitchFamily="49" charset="0"/>
-                <a:cs typeface="Courier New" panose="02070309020205020404" pitchFamily="49" charset="0"/>
-              </a:rPr>
-              <a:t>    private Map&lt;Question, String&gt; answers;</a:t>
-            </a:r>
-            <a:br>
-              <a:rPr lang="en-GB" sz="1200" dirty="0">
-                <a:latin typeface="Courier New" panose="02070309020205020404" pitchFamily="49" charset="0"/>
-                <a:cs typeface="Courier New" panose="02070309020205020404" pitchFamily="49" charset="0"/>
-              </a:rPr>
-            </a:br>
-            <a:br>
-              <a:rPr lang="en-GB" sz="1200" dirty="0">
-                <a:latin typeface="Courier New" panose="02070309020205020404" pitchFamily="49" charset="0"/>
-                <a:cs typeface="Courier New" panose="02070309020205020404" pitchFamily="49" charset="0"/>
-              </a:rPr>
-            </a:br>
-            <a:r>
-              <a:rPr lang="en-GB" sz="1200" dirty="0">
-                <a:latin typeface="Courier New" panose="02070309020205020404" pitchFamily="49" charset="0"/>
-                <a:cs typeface="Courier New" panose="02070309020205020404" pitchFamily="49" charset="0"/>
-              </a:rPr>
-              <a:t>    @</a:t>
-            </a:r>
-            <a:r>
-              <a:rPr lang="en-GB" sz="1200" dirty="0" err="1">
-                <a:latin typeface="Courier New" panose="02070309020205020404" pitchFamily="49" charset="0"/>
-                <a:cs typeface="Courier New" panose="02070309020205020404" pitchFamily="49" charset="0"/>
-              </a:rPr>
-              <a:t>ManyToOne</a:t>
-            </a:r>
-            <a:br>
-              <a:rPr lang="en-GB" sz="1200" dirty="0">
-                <a:latin typeface="Courier New" panose="02070309020205020404" pitchFamily="49" charset="0"/>
-                <a:cs typeface="Courier New" panose="02070309020205020404" pitchFamily="49" charset="0"/>
-              </a:rPr>
-            </a:br>
-            <a:r>
-              <a:rPr lang="en-GB" sz="1200" dirty="0">
-                <a:latin typeface="Courier New" panose="02070309020205020404" pitchFamily="49" charset="0"/>
-                <a:cs typeface="Courier New" panose="02070309020205020404" pitchFamily="49" charset="0"/>
-              </a:rPr>
-              <a:t>    private Questionnaire </a:t>
-            </a:r>
-            <a:r>
-              <a:rPr lang="en-GB" sz="1200" dirty="0" err="1">
-                <a:latin typeface="Courier New" panose="02070309020205020404" pitchFamily="49" charset="0"/>
-                <a:cs typeface="Courier New" panose="02070309020205020404" pitchFamily="49" charset="0"/>
-              </a:rPr>
-              <a:t>relatedQuestionnaire</a:t>
-            </a:r>
-            <a:r>
-              <a:rPr lang="en-GB" sz="1200" dirty="0">
-                <a:latin typeface="Courier New" panose="02070309020205020404" pitchFamily="49" charset="0"/>
-                <a:cs typeface="Courier New" panose="02070309020205020404" pitchFamily="49" charset="0"/>
-              </a:rPr>
-              <a:t>;</a:t>
-            </a:r>
-            <a:br>
-              <a:rPr lang="en-GB" sz="1200" dirty="0">
-                <a:latin typeface="Courier New" panose="02070309020205020404" pitchFamily="49" charset="0"/>
-                <a:cs typeface="Courier New" panose="02070309020205020404" pitchFamily="49" charset="0"/>
-              </a:rPr>
-            </a:br>
-            <a:br>
-              <a:rPr lang="en-GB" sz="1200" dirty="0">
-                <a:latin typeface="Courier New" panose="02070309020205020404" pitchFamily="49" charset="0"/>
-                <a:cs typeface="Courier New" panose="02070309020205020404" pitchFamily="49" charset="0"/>
-              </a:rPr>
-            </a:br>
-            <a:r>
-              <a:rPr lang="en-GB" sz="1200" dirty="0">
-                <a:latin typeface="Courier New" panose="02070309020205020404" pitchFamily="49" charset="0"/>
-                <a:cs typeface="Courier New" panose="02070309020205020404" pitchFamily="49" charset="0"/>
-              </a:rPr>
-              <a:t>    @</a:t>
-            </a:r>
-            <a:r>
-              <a:rPr lang="en-GB" sz="1200" dirty="0" err="1">
-                <a:latin typeface="Courier New" panose="02070309020205020404" pitchFamily="49" charset="0"/>
-                <a:cs typeface="Courier New" panose="02070309020205020404" pitchFamily="49" charset="0"/>
-              </a:rPr>
-              <a:t>ManyToOne</a:t>
-            </a:r>
-            <a:br>
-              <a:rPr lang="en-GB" sz="1200" dirty="0">
-                <a:latin typeface="Courier New" panose="02070309020205020404" pitchFamily="49" charset="0"/>
-                <a:cs typeface="Courier New" panose="02070309020205020404" pitchFamily="49" charset="0"/>
-              </a:rPr>
-            </a:br>
-            <a:r>
-              <a:rPr lang="en-GB" sz="1200" dirty="0">
-                <a:latin typeface="Courier New" panose="02070309020205020404" pitchFamily="49" charset="0"/>
-                <a:cs typeface="Courier New" panose="02070309020205020404" pitchFamily="49" charset="0"/>
-              </a:rPr>
-              <a:t>    private User </a:t>
-            </a:r>
-            <a:r>
-              <a:rPr lang="en-GB" sz="1200" dirty="0" err="1">
-                <a:latin typeface="Courier New" panose="02070309020205020404" pitchFamily="49" charset="0"/>
-                <a:cs typeface="Courier New" panose="02070309020205020404" pitchFamily="49" charset="0"/>
-              </a:rPr>
-              <a:t>relatedUser</a:t>
-            </a:r>
-            <a:r>
-              <a:rPr lang="en-GB" sz="1200" dirty="0">
-                <a:latin typeface="Courier New" panose="02070309020205020404" pitchFamily="49" charset="0"/>
-                <a:cs typeface="Courier New" panose="02070309020205020404" pitchFamily="49" charset="0"/>
-              </a:rPr>
-              <a:t>;</a:t>
+              <a:t>AnswerStatus</a:t>
+            </a:r>
+            <a:r>
+              <a:rPr lang="en-GB" sz="1200" dirty="0">
+                <a:latin typeface="Courier New" panose="02070309020205020404" pitchFamily="49" charset="0"/>
+                <a:cs typeface="Courier New" panose="02070309020205020404" pitchFamily="49" charset="0"/>
+              </a:rPr>
+              <a:t> status;</a:t>
             </a:r>
             <a:br>
               <a:rPr lang="en-GB" sz="1200" dirty="0">
@@ -9715,6 +9393,49 @@
               </a:rPr>
               <a:t>) {</a:t>
             </a:r>
+          </a:p>
+          <a:p>
+            <a:pPr marL="0" indent="0">
+              <a:spcBef>
+                <a:spcPts val="0"/>
+              </a:spcBef>
+              <a:buNone/>
+            </a:pPr>
+            <a:r>
+              <a:rPr lang="en-GB" sz="1200" dirty="0">
+                <a:latin typeface="Courier New" panose="02070309020205020404" pitchFamily="49" charset="0"/>
+                <a:cs typeface="Courier New" panose="02070309020205020404" pitchFamily="49" charset="0"/>
+              </a:rPr>
+              <a:t>        </a:t>
+            </a:r>
+            <a:r>
+              <a:rPr lang="en-GB" sz="1200" dirty="0" err="1">
+                <a:latin typeface="Courier New" panose="02070309020205020404" pitchFamily="49" charset="0"/>
+                <a:cs typeface="Courier New" panose="02070309020205020404" pitchFamily="49" charset="0"/>
+              </a:rPr>
+              <a:t>this.relatedUser</a:t>
+            </a:r>
+            <a:r>
+              <a:rPr lang="en-GB" sz="1200" dirty="0">
+                <a:latin typeface="Courier New" panose="02070309020205020404" pitchFamily="49" charset="0"/>
+                <a:cs typeface="Courier New" panose="02070309020205020404" pitchFamily="49" charset="0"/>
+              </a:rPr>
+              <a:t> = </a:t>
+            </a:r>
+            <a:r>
+              <a:rPr lang="en-GB" sz="1200" dirty="0" err="1">
+                <a:latin typeface="Courier New" panose="02070309020205020404" pitchFamily="49" charset="0"/>
+                <a:cs typeface="Courier New" panose="02070309020205020404" pitchFamily="49" charset="0"/>
+              </a:rPr>
+              <a:t>relatedUser</a:t>
+            </a:r>
+            <a:r>
+              <a:rPr lang="en-GB" sz="1200" dirty="0">
+                <a:latin typeface="Courier New" panose="02070309020205020404" pitchFamily="49" charset="0"/>
+                <a:cs typeface="Courier New" panose="02070309020205020404" pitchFamily="49" charset="0"/>
+              </a:rPr>
+              <a:t>;</a:t>
+            </a:r>
             <a:br>
               <a:rPr lang="en-GB" sz="1200" dirty="0">
                 <a:latin typeface="Courier New" panose="02070309020205020404" pitchFamily="49" charset="0"/>
@@ -9741,47 +9462,6 @@
                 <a:cs typeface="Courier New" panose="02070309020205020404" pitchFamily="49" charset="0"/>
               </a:rPr>
               <a:t> != null) {</a:t>
-            </a:r>
-            <a:br>
-              <a:rPr lang="en-GB" sz="1200" dirty="0">
-                <a:latin typeface="Courier New" panose="02070309020205020404" pitchFamily="49" charset="0"/>
-                <a:cs typeface="Courier New" panose="02070309020205020404" pitchFamily="49" charset="0"/>
-              </a:rPr>
-            </a:br>
-            <a:r>
-              <a:rPr lang="en-GB" sz="1200" dirty="0">
-                <a:latin typeface="Courier New" panose="02070309020205020404" pitchFamily="49" charset="0"/>
-                <a:cs typeface="Courier New" panose="02070309020205020404" pitchFamily="49" charset="0"/>
-              </a:rPr>
-              <a:t>            </a:t>
-            </a:r>
-            <a:r>
-              <a:rPr lang="en-GB" sz="1200" dirty="0" err="1">
-                <a:latin typeface="Courier New" panose="02070309020205020404" pitchFamily="49" charset="0"/>
-                <a:cs typeface="Courier New" panose="02070309020205020404" pitchFamily="49" charset="0"/>
-              </a:rPr>
-              <a:t>this.relatedUser</a:t>
-            </a:r>
-            <a:r>
-              <a:rPr lang="en-GB" sz="1200" dirty="0">
-                <a:latin typeface="Courier New" panose="02070309020205020404" pitchFamily="49" charset="0"/>
-                <a:cs typeface="Courier New" panose="02070309020205020404" pitchFamily="49" charset="0"/>
-              </a:rPr>
-              <a:t> = </a:t>
-            </a:r>
-            <a:r>
-              <a:rPr lang="en-GB" sz="1200" dirty="0" err="1">
-                <a:latin typeface="Courier New" panose="02070309020205020404" pitchFamily="49" charset="0"/>
-                <a:cs typeface="Courier New" panose="02070309020205020404" pitchFamily="49" charset="0"/>
-              </a:rPr>
-              <a:t>relatedUser</a:t>
-            </a:r>
-            <a:r>
-              <a:rPr lang="en-GB" sz="1200" dirty="0">
-                <a:latin typeface="Courier New" panose="02070309020205020404" pitchFamily="49" charset="0"/>
-                <a:cs typeface="Courier New" panose="02070309020205020404" pitchFamily="49" charset="0"/>
-              </a:rPr>
-              <a:t>;</a:t>
             </a:r>
             <a:br>
               <a:rPr lang="en-GB" sz="1200" dirty="0">
@@ -11049,7 +10729,7 @@
         </p:spPr>
         <p:txBody>
           <a:bodyPr>
-            <a:normAutofit fontScale="92500" lnSpcReduction="20000"/>
+            <a:normAutofit fontScale="85000" lnSpcReduction="20000"/>
           </a:bodyPr>
           <a:lstStyle/>
           <a:p>
@@ -11173,6 +10853,14 @@
               <a:rPr lang="en-GB" sz="2000" dirty="0"/>
               <a:t>Registration</a:t>
             </a:r>
+          </a:p>
+          <a:p>
+            <a:pPr lvl="1"/>
+            <a:r>
+              <a:rPr lang="en-GB" sz="2000" dirty="0" err="1"/>
+              <a:t>SeeImg</a:t>
+            </a:r>
+            <a:endParaRPr lang="en-GB" sz="2000" dirty="0"/>
           </a:p>
           <a:p>
             <a:pPr lvl="1"/>
@@ -11202,7 +10890,7 @@
         </p:spPr>
         <p:txBody>
           <a:bodyPr>
-            <a:normAutofit fontScale="92500" lnSpcReduction="20000"/>
+            <a:normAutofit fontScale="85000" lnSpcReduction="20000"/>
           </a:bodyPr>
           <a:lstStyle/>
           <a:p>
@@ -11247,15 +10935,16 @@
             <a:pPr lvl="1"/>
             <a:r>
               <a:rPr lang="en-GB" sz="2000" dirty="0"/>
-              <a:t>Greetings</a:t>
+              <a:t>Home</a:t>
             </a:r>
           </a:p>
           <a:p>
             <a:pPr lvl="1"/>
             <a:r>
-              <a:rPr lang="en-GB" sz="2000" dirty="0"/>
-              <a:t>Home</a:t>
-            </a:r>
+              <a:rPr lang="en-GB" sz="2000" dirty="0" err="1"/>
+              <a:t>InspectQuestionnaire</a:t>
+            </a:r>
+            <a:endParaRPr lang="en-GB" sz="2000" dirty="0"/>
           </a:p>
           <a:p>
             <a:pPr lvl="1"/>
@@ -11271,6 +10960,14 @@
           <a:p>
             <a:pPr lvl="1"/>
             <a:r>
+              <a:rPr lang="en-GB" sz="2000" dirty="0" err="1"/>
+              <a:t>QuestionnaireCompleted</a:t>
+            </a:r>
+            <a:endParaRPr lang="en-GB" sz="2000" dirty="0"/>
+          </a:p>
+          <a:p>
+            <a:pPr lvl="1"/>
+            <a:r>
               <a:rPr lang="en-GB" sz="2000" dirty="0"/>
               <a:t>QuestionnairePt1</a:t>
             </a:r>
@@ -11293,9 +10990,31 @@
             <a:pPr lvl="1"/>
             <a:r>
               <a:rPr lang="en-GB" sz="2000" dirty="0" err="1"/>
+              <a:t>SeeImg</a:t>
+            </a:r>
+            <a:endParaRPr lang="en-GB" sz="2000" dirty="0"/>
+          </a:p>
+          <a:p>
+            <a:pPr lvl="1"/>
+            <a:r>
+              <a:rPr lang="en-GB" sz="2000" dirty="0" err="1"/>
               <a:t>WriteReview</a:t>
             </a:r>
             <a:endParaRPr lang="en-GB" sz="2000" dirty="0"/>
+          </a:p>
+          <a:p>
+            <a:pPr lvl="1"/>
+            <a:r>
+              <a:rPr lang="en-GB" sz="2000" dirty="0"/>
+              <a:t>Blocked</a:t>
+            </a:r>
+          </a:p>
+          <a:p>
+            <a:pPr lvl="1"/>
+            <a:r>
+              <a:rPr lang="en-GB" sz="2000" dirty="0"/>
+              <a:t>index</a:t>
+            </a:r>
           </a:p>
           <a:p>
             <a:pPr lvl="1"/>

</xml_diff>